<commit_message>
Added question two slides
Added all the slides for discussing question two. The rest of the
skeleton for other questions is still up too.
</commit_message>
<xml_diff>
--- a/Presentation.pptx
+++ b/Presentation.pptx
@@ -5,10 +5,10 @@
     <p:sldMasterId id="2147483912" r:id="rId2"/>
   </p:sldMasterIdLst>
   <p:notesMasterIdLst>
-    <p:notesMasterId r:id="rId15"/>
+    <p:notesMasterId r:id="rId17"/>
   </p:notesMasterIdLst>
   <p:handoutMasterIdLst>
-    <p:handoutMasterId r:id="rId16"/>
+    <p:handoutMasterId r:id="rId18"/>
   </p:handoutMasterIdLst>
   <p:sldIdLst>
     <p:sldId id="256" r:id="rId3"/>
@@ -17,12 +17,14 @@
     <p:sldId id="270" r:id="rId6"/>
     <p:sldId id="265" r:id="rId7"/>
     <p:sldId id="274" r:id="rId8"/>
-    <p:sldId id="276" r:id="rId9"/>
-    <p:sldId id="277" r:id="rId10"/>
-    <p:sldId id="275" r:id="rId11"/>
-    <p:sldId id="279" r:id="rId12"/>
-    <p:sldId id="278" r:id="rId13"/>
-    <p:sldId id="280" r:id="rId14"/>
+    <p:sldId id="281" r:id="rId9"/>
+    <p:sldId id="282" r:id="rId10"/>
+    <p:sldId id="277" r:id="rId11"/>
+    <p:sldId id="284" r:id="rId12"/>
+    <p:sldId id="275" r:id="rId13"/>
+    <p:sldId id="279" r:id="rId14"/>
+    <p:sldId id="278" r:id="rId15"/>
+    <p:sldId id="280" r:id="rId16"/>
   </p:sldIdLst>
   <p:sldSz cx="12188825" cy="6858000"/>
   <p:notesSz cx="6858000" cy="9144000"/>
@@ -666,6 +668,90 @@
     </a:lvl9pPr>
   </p:notesStyle>
 </p:notesMaster>
+</file>
+
+<file path=ppt/notesSlides/notesSlide1.xml><?xml version="1.0" encoding="utf-8"?>
+<p:notes xmlns:a="http://schemas.openxmlformats.org/drawingml/2006/main" xmlns:r="http://schemas.openxmlformats.org/officeDocument/2006/relationships" xmlns:p="http://schemas.openxmlformats.org/presentationml/2006/main">
+  <p:cSld>
+    <p:spTree>
+      <p:nvGrpSpPr>
+        <p:cNvPr id="1" name=""/>
+        <p:cNvGrpSpPr/>
+        <p:nvPr/>
+      </p:nvGrpSpPr>
+      <p:grpSpPr>
+        <a:xfrm>
+          <a:off x="0" y="0"/>
+          <a:ext cx="0" cy="0"/>
+          <a:chOff x="0" y="0"/>
+          <a:chExt cx="0" cy="0"/>
+        </a:xfrm>
+      </p:grpSpPr>
+      <p:sp>
+        <p:nvSpPr>
+          <p:cNvPr id="2" name="Slide Image Placeholder 1"/>
+          <p:cNvSpPr>
+            <a:spLocks noGrp="1" noRot="1" noChangeAspect="1"/>
+          </p:cNvSpPr>
+          <p:nvPr>
+            <p:ph type="sldImg"/>
+          </p:nvPr>
+        </p:nvSpPr>
+        <p:spPr/>
+      </p:sp>
+      <p:sp>
+        <p:nvSpPr>
+          <p:cNvPr id="3" name="Notes Placeholder 2"/>
+          <p:cNvSpPr>
+            <a:spLocks noGrp="1"/>
+          </p:cNvSpPr>
+          <p:nvPr>
+            <p:ph type="body" idx="1"/>
+          </p:nvPr>
+        </p:nvSpPr>
+        <p:spPr/>
+        <p:txBody>
+          <a:bodyPr/>
+          <a:lstStyle/>
+          <a:p>
+            <a:endParaRPr lang="en-US" dirty="0"/>
+          </a:p>
+        </p:txBody>
+      </p:sp>
+      <p:sp>
+        <p:nvSpPr>
+          <p:cNvPr id="4" name="Slide Number Placeholder 3"/>
+          <p:cNvSpPr>
+            <a:spLocks noGrp="1"/>
+          </p:cNvSpPr>
+          <p:nvPr>
+            <p:ph type="sldNum" sz="quarter" idx="10"/>
+          </p:nvPr>
+        </p:nvSpPr>
+        <p:spPr/>
+        <p:txBody>
+          <a:bodyPr/>
+          <a:lstStyle/>
+          <a:p>
+            <a:fld id="{BF105DB2-FD3E-441D-8B7E-7AE83ECE27B3}" type="slidenum">
+              <a:rPr lang="en-US" smtClean="0"/>
+              <a:t>7</a:t>
+            </a:fld>
+            <a:endParaRPr lang="en-US"/>
+          </a:p>
+        </p:txBody>
+      </p:sp>
+    </p:spTree>
+    <p:extLst>
+      <p:ext uri="{BB962C8B-B14F-4D97-AF65-F5344CB8AC3E}">
+        <p14:creationId xmlns:p14="http://schemas.microsoft.com/office/powerpoint/2010/main" val="2925313509"/>
+      </p:ext>
+    </p:extLst>
+  </p:cSld>
+  <p:clrMapOvr>
+    <a:masterClrMapping/>
+  </p:clrMapOvr>
+</p:notes>
 </file>
 
 <file path=ppt/slideLayouts/slideLayout1.xml><?xml version="1.0" encoding="utf-8"?>
@@ -5037,7 +5123,7 @@
       </p:grpSpPr>
       <p:sp>
         <p:nvSpPr>
-          <p:cNvPr id="6" name="Title 5"/>
+          <p:cNvPr id="2" name="Title 1"/>
           <p:cNvSpPr>
             <a:spLocks noGrp="1"/>
           </p:cNvSpPr>
@@ -5052,34 +5138,194 @@
           <a:p>
             <a:r>
               <a:rPr lang="en-US" dirty="0"/>
-              <a:t>ADD STUFF HERE</a:t>
-            </a:r>
-          </a:p>
-        </p:txBody>
-      </p:sp>
-      <p:sp>
-        <p:nvSpPr>
-          <p:cNvPr id="4" name="Content Placeholder 3"/>
-          <p:cNvSpPr>
-            <a:spLocks noGrp="1"/>
-          </p:cNvSpPr>
+              <a:t>Four Evolutions in Time</a:t>
+            </a:r>
+          </a:p>
+        </p:txBody>
+      </p:sp>
+      <p:sp>
+        <p:nvSpPr>
+          <p:cNvPr id="4" name="Text Placeholder 3"/>
+          <p:cNvSpPr>
+            <a:spLocks noGrp="1"/>
+          </p:cNvSpPr>
+          <p:nvPr>
+            <p:ph type="body" sz="half" idx="2"/>
+          </p:nvPr>
+        </p:nvSpPr>
+        <p:spPr/>
+        <p:txBody>
+          <a:bodyPr>
+            <a:normAutofit lnSpcReduction="10000"/>
+          </a:bodyPr>
+          <a:lstStyle/>
+          <a:p>
+            <a:r>
+              <a:rPr lang="en-US" dirty="0"/>
+              <a:t>A sigma fit was performed for each time snapshot, and they match very well with the expected:</a:t>
+            </a:r>
+          </a:p>
+          <a:p>
+            <a:endParaRPr lang="en-US" dirty="0"/>
+          </a:p>
+          <a:p>
+            <a:endParaRPr lang="en-US" dirty="0"/>
+          </a:p>
+          <a:p>
+            <a:r>
+              <a:rPr lang="en-US" dirty="0"/>
+              <a:t>Note: Edge effects distorting the fit at later times.</a:t>
+            </a:r>
+          </a:p>
+        </p:txBody>
+      </p:sp>
+      <p:pic>
+        <p:nvPicPr>
+          <p:cNvPr id="3" name="Picture 2"/>
+          <p:cNvPicPr>
+            <a:picLocks noChangeAspect="1"/>
+          </p:cNvPicPr>
+          <p:nvPr/>
+        </p:nvPicPr>
+        <p:blipFill>
+          <a:blip r:embed="rId2"/>
+          <a:stretch>
+            <a:fillRect/>
+          </a:stretch>
+        </p:blipFill>
+        <p:spPr>
+          <a:xfrm>
+            <a:off x="8609012" y="4283013"/>
+            <a:ext cx="1123950" cy="304800"/>
+          </a:xfrm>
+          <a:prstGeom prst="rect">
+            <a:avLst/>
+          </a:prstGeom>
+        </p:spPr>
+      </p:pic>
+      <p:pic>
+        <p:nvPicPr>
+          <p:cNvPr id="9" name="Content Placeholder 8"/>
+          <p:cNvPicPr>
+            <a:picLocks noGrp="1" noChangeAspect="1"/>
+          </p:cNvPicPr>
           <p:nvPr>
             <p:ph idx="1"/>
           </p:nvPr>
-        </p:nvSpPr>
-        <p:spPr/>
-        <p:txBody>
-          <a:bodyPr/>
-          <a:lstStyle/>
-          <a:p>
-            <a:endParaRPr lang="en-US"/>
-          </a:p>
-        </p:txBody>
-      </p:sp>
+        </p:nvPicPr>
+        <p:blipFill>
+          <a:blip r:embed="rId3" cstate="print">
+            <a:extLst>
+              <a:ext uri="{28A0092B-C50C-407E-A947-70E740481C1C}">
+                <a14:useLocalDpi xmlns:a14="http://schemas.microsoft.com/office/drawing/2010/main" val="0"/>
+              </a:ext>
+            </a:extLst>
+          </a:blip>
+          <a:stretch>
+            <a:fillRect/>
+          </a:stretch>
+        </p:blipFill>
+        <p:spPr>
+          <a:xfrm>
+            <a:off x="1293812" y="1143000"/>
+            <a:ext cx="2971800" cy="2228850"/>
+          </a:xfrm>
+        </p:spPr>
+      </p:pic>
+      <p:pic>
+        <p:nvPicPr>
+          <p:cNvPr id="11" name="Picture 10"/>
+          <p:cNvPicPr>
+            <a:picLocks noChangeAspect="1"/>
+          </p:cNvPicPr>
+          <p:nvPr/>
+        </p:nvPicPr>
+        <p:blipFill>
+          <a:blip r:embed="rId4" cstate="print">
+            <a:extLst>
+              <a:ext uri="{28A0092B-C50C-407E-A947-70E740481C1C}">
+                <a14:useLocalDpi xmlns:a14="http://schemas.microsoft.com/office/drawing/2010/main" val="0"/>
+              </a:ext>
+            </a:extLst>
+          </a:blip>
+          <a:stretch>
+            <a:fillRect/>
+          </a:stretch>
+        </p:blipFill>
+        <p:spPr>
+          <a:xfrm>
+            <a:off x="4265612" y="1104900"/>
+            <a:ext cx="3022600" cy="2266950"/>
+          </a:xfrm>
+          <a:prstGeom prst="rect">
+            <a:avLst/>
+          </a:prstGeom>
+        </p:spPr>
+      </p:pic>
+      <p:pic>
+        <p:nvPicPr>
+          <p:cNvPr id="13" name="Picture 12"/>
+          <p:cNvPicPr>
+            <a:picLocks noChangeAspect="1"/>
+          </p:cNvPicPr>
+          <p:nvPr/>
+        </p:nvPicPr>
+        <p:blipFill>
+          <a:blip r:embed="rId5" cstate="print">
+            <a:extLst>
+              <a:ext uri="{28A0092B-C50C-407E-A947-70E740481C1C}">
+                <a14:useLocalDpi xmlns:a14="http://schemas.microsoft.com/office/drawing/2010/main" val="0"/>
+              </a:ext>
+            </a:extLst>
+          </a:blip>
+          <a:stretch>
+            <a:fillRect/>
+          </a:stretch>
+        </p:blipFill>
+        <p:spPr>
+          <a:xfrm>
+            <a:off x="1293812" y="3228600"/>
+            <a:ext cx="3048000" cy="2286000"/>
+          </a:xfrm>
+          <a:prstGeom prst="rect">
+            <a:avLst/>
+          </a:prstGeom>
+        </p:spPr>
+      </p:pic>
+      <p:pic>
+        <p:nvPicPr>
+          <p:cNvPr id="15" name="Picture 14"/>
+          <p:cNvPicPr>
+            <a:picLocks noChangeAspect="1"/>
+          </p:cNvPicPr>
+          <p:nvPr/>
+        </p:nvPicPr>
+        <p:blipFill>
+          <a:blip r:embed="rId6" cstate="print">
+            <a:extLst>
+              <a:ext uri="{28A0092B-C50C-407E-A947-70E740481C1C}">
+                <a14:useLocalDpi xmlns:a14="http://schemas.microsoft.com/office/drawing/2010/main" val="0"/>
+              </a:ext>
+            </a:extLst>
+          </a:blip>
+          <a:stretch>
+            <a:fillRect/>
+          </a:stretch>
+        </p:blipFill>
+        <p:spPr>
+          <a:xfrm>
+            <a:off x="4224527" y="3228599"/>
+            <a:ext cx="3048001" cy="2286001"/>
+          </a:xfrm>
+          <a:prstGeom prst="rect">
+            <a:avLst/>
+          </a:prstGeom>
+        </p:spPr>
+      </p:pic>
     </p:spTree>
     <p:extLst>
       <p:ext uri="{BB962C8B-B14F-4D97-AF65-F5344CB8AC3E}">
-        <p14:creationId xmlns:p14="http://schemas.microsoft.com/office/powerpoint/2010/main" val="569170269"/>
+        <p14:creationId xmlns:p14="http://schemas.microsoft.com/office/powerpoint/2010/main" val="375964365"/>
       </p:ext>
     </p:extLst>
   </p:cSld>
@@ -5135,6 +5381,153 @@
           <a:p>
             <a:r>
               <a:rPr lang="en-US" dirty="0"/>
+              <a:t>Cluster Growth using DLA</a:t>
+            </a:r>
+          </a:p>
+        </p:txBody>
+      </p:sp>
+    </p:spTree>
+    <p:extLst>
+      <p:ext uri="{BB962C8B-B14F-4D97-AF65-F5344CB8AC3E}">
+        <p14:creationId xmlns:p14="http://schemas.microsoft.com/office/powerpoint/2010/main" val="2592630319"/>
+      </p:ext>
+    </p:extLst>
+  </p:cSld>
+  <p:clrMapOvr>
+    <a:masterClrMapping/>
+  </p:clrMapOvr>
+  <mc:AlternateContent xmlns:mc="http://schemas.openxmlformats.org/markup-compatibility/2006" xmlns:p14="http://schemas.microsoft.com/office/powerpoint/2010/main">
+    <mc:Choice Requires="p14">
+      <p:transition spd="med" p14:dur="700">
+        <p:fade/>
+      </p:transition>
+    </mc:Choice>
+    <mc:Fallback xmlns="">
+      <p:transition spd="med">
+        <p:fade/>
+      </p:transition>
+    </mc:Fallback>
+  </mc:AlternateContent>
+</p:sld>
+</file>
+
+<file path=ppt/slides/slide12.xml><?xml version="1.0" encoding="utf-8"?>
+<p:sld xmlns:a="http://schemas.openxmlformats.org/drawingml/2006/main" xmlns:r="http://schemas.openxmlformats.org/officeDocument/2006/relationships" xmlns:p="http://schemas.openxmlformats.org/presentationml/2006/main">
+  <p:cSld>
+    <p:spTree>
+      <p:nvGrpSpPr>
+        <p:cNvPr id="1" name=""/>
+        <p:cNvGrpSpPr/>
+        <p:nvPr/>
+      </p:nvGrpSpPr>
+      <p:grpSpPr>
+        <a:xfrm>
+          <a:off x="0" y="0"/>
+          <a:ext cx="0" cy="0"/>
+          <a:chOff x="0" y="0"/>
+          <a:chExt cx="0" cy="0"/>
+        </a:xfrm>
+      </p:grpSpPr>
+      <p:sp>
+        <p:nvSpPr>
+          <p:cNvPr id="6" name="Title 5"/>
+          <p:cNvSpPr>
+            <a:spLocks noGrp="1"/>
+          </p:cNvSpPr>
+          <p:nvPr>
+            <p:ph type="title"/>
+          </p:nvPr>
+        </p:nvSpPr>
+        <p:spPr/>
+        <p:txBody>
+          <a:bodyPr/>
+          <a:lstStyle/>
+          <a:p>
+            <a:r>
+              <a:rPr lang="en-US" dirty="0"/>
+              <a:t>ADD STUFF HERE</a:t>
+            </a:r>
+          </a:p>
+        </p:txBody>
+      </p:sp>
+      <p:sp>
+        <p:nvSpPr>
+          <p:cNvPr id="4" name="Content Placeholder 3"/>
+          <p:cNvSpPr>
+            <a:spLocks noGrp="1"/>
+          </p:cNvSpPr>
+          <p:nvPr>
+            <p:ph idx="1"/>
+          </p:nvPr>
+        </p:nvSpPr>
+        <p:spPr/>
+        <p:txBody>
+          <a:bodyPr/>
+          <a:lstStyle/>
+          <a:p>
+            <a:endParaRPr lang="en-US"/>
+          </a:p>
+        </p:txBody>
+      </p:sp>
+    </p:spTree>
+    <p:extLst>
+      <p:ext uri="{BB962C8B-B14F-4D97-AF65-F5344CB8AC3E}">
+        <p14:creationId xmlns:p14="http://schemas.microsoft.com/office/powerpoint/2010/main" val="569170269"/>
+      </p:ext>
+    </p:extLst>
+  </p:cSld>
+  <p:clrMapOvr>
+    <a:masterClrMapping/>
+  </p:clrMapOvr>
+  <mc:AlternateContent xmlns:mc="http://schemas.openxmlformats.org/markup-compatibility/2006" xmlns:p14="http://schemas.microsoft.com/office/powerpoint/2010/main">
+    <mc:Choice Requires="p14">
+      <p:transition spd="med" p14:dur="700">
+        <p:fade/>
+      </p:transition>
+    </mc:Choice>
+    <mc:Fallback xmlns="">
+      <p:transition spd="med">
+        <p:fade/>
+      </p:transition>
+    </mc:Fallback>
+  </mc:AlternateContent>
+</p:sld>
+</file>
+
+<file path=ppt/slides/slide13.xml><?xml version="1.0" encoding="utf-8"?>
+<p:sld xmlns:a="http://schemas.openxmlformats.org/drawingml/2006/main" xmlns:r="http://schemas.openxmlformats.org/officeDocument/2006/relationships" xmlns:p="http://schemas.openxmlformats.org/presentationml/2006/main">
+  <p:cSld>
+    <p:spTree>
+      <p:nvGrpSpPr>
+        <p:cNvPr id="1" name=""/>
+        <p:cNvGrpSpPr/>
+        <p:nvPr/>
+      </p:nvGrpSpPr>
+      <p:grpSpPr>
+        <a:xfrm>
+          <a:off x="0" y="0"/>
+          <a:ext cx="0" cy="0"/>
+          <a:chOff x="0" y="0"/>
+          <a:chExt cx="0" cy="0"/>
+        </a:xfrm>
+      </p:grpSpPr>
+      <p:sp>
+        <p:nvSpPr>
+          <p:cNvPr id="2" name="Title 1"/>
+          <p:cNvSpPr>
+            <a:spLocks noGrp="1"/>
+          </p:cNvSpPr>
+          <p:nvPr>
+            <p:ph type="title"/>
+          </p:nvPr>
+        </p:nvSpPr>
+        <p:spPr/>
+        <p:txBody>
+          <a:bodyPr/>
+          <a:lstStyle/>
+          <a:p>
+            <a:r>
+              <a:rPr lang="en-US" dirty="0"/>
               <a:t>Add PLOTS</a:t>
             </a:r>
           </a:p>
@@ -5205,7 +5598,7 @@
 </p:sld>
 </file>
 
-<file path=ppt/slides/slide12.xml><?xml version="1.0" encoding="utf-8"?>
+<file path=ppt/slides/slide14.xml><?xml version="1.0" encoding="utf-8"?>
 <p:sld xmlns:a="http://schemas.openxmlformats.org/drawingml/2006/main" xmlns:r="http://schemas.openxmlformats.org/officeDocument/2006/relationships" xmlns:p="http://schemas.openxmlformats.org/presentationml/2006/main">
   <p:cSld>
     <p:spTree>
@@ -5664,7 +6057,7 @@
           <a:p>
             <a:r>
               <a:rPr lang="en-US" dirty="0"/>
-              <a:t>1D Diffusion Equation</a:t>
+              <a:t>1D Diffusion Equation Solver</a:t>
             </a:r>
           </a:p>
         </p:txBody>
@@ -5713,7 +6106,7 @@
       </p:grpSpPr>
       <p:sp>
         <p:nvSpPr>
-          <p:cNvPr id="6" name="Title 5"/>
+          <p:cNvPr id="2" name="Title 1"/>
           <p:cNvSpPr>
             <a:spLocks noGrp="1"/>
           </p:cNvSpPr>
@@ -5721,41 +6114,400 @@
             <p:ph type="title"/>
           </p:nvPr>
         </p:nvSpPr>
-        <p:spPr/>
+        <p:spPr>
+          <a:xfrm>
+            <a:off x="925569" y="609600"/>
+            <a:ext cx="9740845" cy="1066800"/>
+          </a:xfrm>
+        </p:spPr>
         <p:txBody>
           <a:bodyPr/>
           <a:lstStyle/>
           <a:p>
             <a:r>
               <a:rPr lang="en-US" dirty="0"/>
-              <a:t>ADD STUFF HERE</a:t>
-            </a:r>
-          </a:p>
-        </p:txBody>
-      </p:sp>
-      <p:sp>
-        <p:nvSpPr>
-          <p:cNvPr id="4" name="Content Placeholder 3"/>
-          <p:cNvSpPr>
-            <a:spLocks noGrp="1"/>
-          </p:cNvSpPr>
-          <p:nvPr>
-            <p:ph idx="1"/>
-          </p:nvPr>
-        </p:nvSpPr>
-        <p:spPr/>
+              <a:t>Modelling the Equation</a:t>
+            </a:r>
+          </a:p>
+        </p:txBody>
+      </p:sp>
+      <p:sp>
+        <p:nvSpPr>
+          <p:cNvPr id="3" name="Text Placeholder 2"/>
+          <p:cNvSpPr>
+            <a:spLocks noGrp="1"/>
+          </p:cNvSpPr>
+          <p:nvPr>
+            <p:ph type="body" idx="1"/>
+          </p:nvPr>
+        </p:nvSpPr>
+        <p:spPr>
+          <a:xfrm>
+            <a:off x="925569" y="1828800"/>
+            <a:ext cx="5016443" cy="685801"/>
+          </a:xfrm>
+        </p:spPr>
         <p:txBody>
           <a:bodyPr/>
           <a:lstStyle/>
           <a:p>
-            <a:endParaRPr lang="en-US"/>
-          </a:p>
-        </p:txBody>
-      </p:sp>
+            <a:r>
+              <a:rPr lang="en-US" dirty="0"/>
+              <a:t>Differential Form</a:t>
+            </a:r>
+          </a:p>
+        </p:txBody>
+      </p:sp>
+      <p:pic>
+        <p:nvPicPr>
+          <p:cNvPr id="7" name="Content Placeholder 6"/>
+          <p:cNvPicPr>
+            <a:picLocks noGrp="1" noChangeAspect="1"/>
+          </p:cNvPicPr>
+          <p:nvPr>
+            <p:ph sz="half" idx="2"/>
+          </p:nvPr>
+        </p:nvPicPr>
+        <p:blipFill>
+          <a:blip r:embed="rId3"/>
+          <a:stretch>
+            <a:fillRect/>
+          </a:stretch>
+        </p:blipFill>
+        <p:spPr>
+          <a:xfrm>
+            <a:off x="1751012" y="2567413"/>
+            <a:ext cx="2652364" cy="933450"/>
+          </a:xfrm>
+          <a:prstGeom prst="rect">
+            <a:avLst/>
+          </a:prstGeom>
+        </p:spPr>
+      </p:pic>
+      <p:sp>
+        <p:nvSpPr>
+          <p:cNvPr id="5" name="Text Placeholder 4"/>
+          <p:cNvSpPr>
+            <a:spLocks noGrp="1"/>
+          </p:cNvSpPr>
+          <p:nvPr>
+            <p:ph type="body" sz="quarter" idx="3"/>
+          </p:nvPr>
+        </p:nvSpPr>
+        <p:spPr>
+          <a:xfrm>
+            <a:off x="5789612" y="1828800"/>
+            <a:ext cx="4876801" cy="685801"/>
+          </a:xfrm>
+        </p:spPr>
+        <p:txBody>
+          <a:bodyPr/>
+          <a:lstStyle/>
+          <a:p>
+            <a:r>
+              <a:rPr lang="en-US" dirty="0"/>
+              <a:t>Finite Difference Form</a:t>
+            </a:r>
+          </a:p>
+        </p:txBody>
+      </p:sp>
+      <p:pic>
+        <p:nvPicPr>
+          <p:cNvPr id="8" name="Content Placeholder 7"/>
+          <p:cNvPicPr>
+            <a:picLocks noGrp="1" noChangeAspect="1"/>
+          </p:cNvPicPr>
+          <p:nvPr>
+            <p:ph sz="quarter" idx="4"/>
+          </p:nvPr>
+        </p:nvPicPr>
+        <p:blipFill>
+          <a:blip r:embed="rId4"/>
+          <a:stretch>
+            <a:fillRect/>
+          </a:stretch>
+        </p:blipFill>
+        <p:spPr>
+          <a:xfrm>
+            <a:off x="6996055" y="2786932"/>
+            <a:ext cx="2768713" cy="494413"/>
+          </a:xfrm>
+          <a:prstGeom prst="rect">
+            <a:avLst/>
+          </a:prstGeom>
+        </p:spPr>
+      </p:pic>
+      <p:sp>
+        <p:nvSpPr>
+          <p:cNvPr id="9" name="TextBox 8"/>
+          <p:cNvSpPr txBox="1"/>
+          <p:nvPr/>
+        </p:nvSpPr>
+        <p:spPr>
+          <a:xfrm>
+            <a:off x="5789612" y="2362200"/>
+            <a:ext cx="4572000" cy="3083921"/>
+          </a:xfrm>
+          <a:prstGeom prst="rect">
+            <a:avLst/>
+          </a:prstGeom>
+          <a:noFill/>
+        </p:spPr>
+        <p:txBody>
+          <a:bodyPr wrap="square" rtlCol="0">
+            <a:spAutoFit/>
+          </a:bodyPr>
+          <a:lstStyle/>
+          <a:p>
+            <a:pPr marL="342900" indent="-342900">
+              <a:lnSpc>
+                <a:spcPct val="90000"/>
+              </a:lnSpc>
+              <a:buFont typeface="Arial" panose="020B0604020202020204" pitchFamily="34" charset="0"/>
+              <a:buChar char="•"/>
+            </a:pPr>
+            <a:r>
+              <a:rPr lang="en-US" sz="2400" dirty="0"/>
+              <a:t>Convert to an iterable form</a:t>
+            </a:r>
+          </a:p>
+          <a:p>
+            <a:pPr marL="342900" indent="-342900">
+              <a:lnSpc>
+                <a:spcPct val="90000"/>
+              </a:lnSpc>
+              <a:buFont typeface="Arial" panose="020B0604020202020204" pitchFamily="34" charset="0"/>
+              <a:buChar char="•"/>
+            </a:pPr>
+            <a:endParaRPr lang="en-US" sz="2400" dirty="0"/>
+          </a:p>
+          <a:p>
+            <a:pPr marL="342900" indent="-342900">
+              <a:lnSpc>
+                <a:spcPct val="90000"/>
+              </a:lnSpc>
+              <a:buFont typeface="Arial" panose="020B0604020202020204" pitchFamily="34" charset="0"/>
+              <a:buChar char="•"/>
+            </a:pPr>
+            <a:endParaRPr lang="en-US" sz="2400" dirty="0"/>
+          </a:p>
+          <a:p>
+            <a:pPr marL="342900" indent="-342900">
+              <a:lnSpc>
+                <a:spcPct val="90000"/>
+              </a:lnSpc>
+              <a:buFont typeface="Arial" panose="020B0604020202020204" pitchFamily="34" charset="0"/>
+              <a:buChar char="•"/>
+            </a:pPr>
+            <a:r>
+              <a:rPr lang="en-US" sz="2400" dirty="0"/>
+              <a:t>Algebraically manipulate formal derivatives</a:t>
+            </a:r>
+          </a:p>
+          <a:p>
+            <a:pPr marL="342900" indent="-342900">
+              <a:lnSpc>
+                <a:spcPct val="90000"/>
+              </a:lnSpc>
+              <a:buFont typeface="Arial" panose="020B0604020202020204" pitchFamily="34" charset="0"/>
+              <a:buChar char="•"/>
+            </a:pPr>
+            <a:endParaRPr lang="en-US" sz="2400" dirty="0"/>
+          </a:p>
+          <a:p>
+            <a:pPr marL="342900" indent="-342900">
+              <a:lnSpc>
+                <a:spcPct val="90000"/>
+              </a:lnSpc>
+              <a:buFont typeface="Arial" panose="020B0604020202020204" pitchFamily="34" charset="0"/>
+              <a:buChar char="•"/>
+            </a:pPr>
+            <a:endParaRPr lang="en-US" sz="2400" dirty="0"/>
+          </a:p>
+          <a:p>
+            <a:pPr marL="342900" indent="-342900">
+              <a:lnSpc>
+                <a:spcPct val="90000"/>
+              </a:lnSpc>
+              <a:buFont typeface="Arial" panose="020B0604020202020204" pitchFamily="34" charset="0"/>
+              <a:buChar char="•"/>
+            </a:pPr>
+            <a:r>
+              <a:rPr lang="en-US" sz="2400" dirty="0"/>
+              <a:t>For our purposes, D=2 and stability is guaranteed by</a:t>
+            </a:r>
+          </a:p>
+        </p:txBody>
+      </p:sp>
+      <p:pic>
+        <p:nvPicPr>
+          <p:cNvPr id="10" name="Picture 9"/>
+          <p:cNvPicPr>
+            <a:picLocks noChangeAspect="1"/>
+          </p:cNvPicPr>
+          <p:nvPr/>
+        </p:nvPicPr>
+        <p:blipFill>
+          <a:blip r:embed="rId5"/>
+          <a:stretch>
+            <a:fillRect/>
+          </a:stretch>
+        </p:blipFill>
+        <p:spPr>
+          <a:xfrm>
+            <a:off x="6475412" y="3989949"/>
+            <a:ext cx="5134810" cy="582051"/>
+          </a:xfrm>
+          <a:prstGeom prst="rect">
+            <a:avLst/>
+          </a:prstGeom>
+        </p:spPr>
+      </p:pic>
+      <p:sp>
+        <p:nvSpPr>
+          <p:cNvPr id="11" name="TextBox 10"/>
+          <p:cNvSpPr txBox="1"/>
+          <p:nvPr/>
+        </p:nvSpPr>
+        <p:spPr>
+          <a:xfrm>
+            <a:off x="925569" y="2362200"/>
+            <a:ext cx="4559243" cy="1754326"/>
+          </a:xfrm>
+          <a:prstGeom prst="rect">
+            <a:avLst/>
+          </a:prstGeom>
+          <a:noFill/>
+        </p:spPr>
+        <p:txBody>
+          <a:bodyPr wrap="square" rtlCol="0">
+            <a:spAutoFit/>
+          </a:bodyPr>
+          <a:lstStyle/>
+          <a:p>
+            <a:pPr marL="342900" indent="-342900">
+              <a:lnSpc>
+                <a:spcPct val="90000"/>
+              </a:lnSpc>
+              <a:buFont typeface="Arial" panose="020B0604020202020204" pitchFamily="34" charset="0"/>
+              <a:buChar char="•"/>
+            </a:pPr>
+            <a:r>
+              <a:rPr lang="en-US" sz="2400" dirty="0"/>
+              <a:t>Time dependent diff. eq.</a:t>
+            </a:r>
+          </a:p>
+          <a:p>
+            <a:pPr marL="342900" indent="-342900">
+              <a:lnSpc>
+                <a:spcPct val="90000"/>
+              </a:lnSpc>
+              <a:buFont typeface="Arial" panose="020B0604020202020204" pitchFamily="34" charset="0"/>
+              <a:buChar char="•"/>
+            </a:pPr>
+            <a:endParaRPr lang="en-US" sz="2400" dirty="0"/>
+          </a:p>
+          <a:p>
+            <a:pPr marL="342900" indent="-342900">
+              <a:lnSpc>
+                <a:spcPct val="90000"/>
+              </a:lnSpc>
+              <a:buFont typeface="Arial" panose="020B0604020202020204" pitchFamily="34" charset="0"/>
+              <a:buChar char="•"/>
+            </a:pPr>
+            <a:endParaRPr lang="en-US" sz="2400" dirty="0"/>
+          </a:p>
+          <a:p>
+            <a:pPr marL="342900" indent="-342900">
+              <a:lnSpc>
+                <a:spcPct val="90000"/>
+              </a:lnSpc>
+              <a:buFont typeface="Arial" panose="020B0604020202020204" pitchFamily="34" charset="0"/>
+              <a:buChar char="•"/>
+            </a:pPr>
+            <a:r>
+              <a:rPr lang="en-US" sz="2400" dirty="0"/>
+              <a:t>For a box density, later solutions should be Gaussian </a:t>
+            </a:r>
+          </a:p>
+        </p:txBody>
+      </p:sp>
+      <p:pic>
+        <p:nvPicPr>
+          <p:cNvPr id="12" name="Picture 11"/>
+          <p:cNvPicPr>
+            <a:picLocks noChangeAspect="1"/>
+          </p:cNvPicPr>
+          <p:nvPr/>
+        </p:nvPicPr>
+        <p:blipFill>
+          <a:blip r:embed="rId6"/>
+          <a:stretch>
+            <a:fillRect/>
+          </a:stretch>
+        </p:blipFill>
+        <p:spPr>
+          <a:xfrm>
+            <a:off x="1428777" y="4105270"/>
+            <a:ext cx="3552825" cy="638175"/>
+          </a:xfrm>
+          <a:prstGeom prst="rect">
+            <a:avLst/>
+          </a:prstGeom>
+        </p:spPr>
+      </p:pic>
+      <p:pic>
+        <p:nvPicPr>
+          <p:cNvPr id="13" name="Picture 12"/>
+          <p:cNvPicPr>
+            <a:picLocks noChangeAspect="1"/>
+          </p:cNvPicPr>
+          <p:nvPr/>
+        </p:nvPicPr>
+        <p:blipFill>
+          <a:blip r:embed="rId7"/>
+          <a:stretch>
+            <a:fillRect/>
+          </a:stretch>
+        </p:blipFill>
+        <p:spPr>
+          <a:xfrm>
+            <a:off x="1674812" y="4781550"/>
+            <a:ext cx="1304925" cy="323850"/>
+          </a:xfrm>
+          <a:prstGeom prst="rect">
+            <a:avLst/>
+          </a:prstGeom>
+        </p:spPr>
+      </p:pic>
+      <p:pic>
+        <p:nvPicPr>
+          <p:cNvPr id="14" name="Picture 13"/>
+          <p:cNvPicPr>
+            <a:picLocks noChangeAspect="1"/>
+          </p:cNvPicPr>
+          <p:nvPr/>
+        </p:nvPicPr>
+        <p:blipFill>
+          <a:blip r:embed="rId8"/>
+          <a:stretch>
+            <a:fillRect/>
+          </a:stretch>
+        </p:blipFill>
+        <p:spPr>
+          <a:xfrm>
+            <a:off x="7470774" y="5360396"/>
+            <a:ext cx="1209675" cy="619125"/>
+          </a:xfrm>
+          <a:prstGeom prst="rect">
+            <a:avLst/>
+          </a:prstGeom>
+        </p:spPr>
+      </p:pic>
     </p:spTree>
     <p:extLst>
       <p:ext uri="{BB962C8B-B14F-4D97-AF65-F5344CB8AC3E}">
-        <p14:creationId xmlns:p14="http://schemas.microsoft.com/office/powerpoint/2010/main" val="1579860044"/>
+        <p14:creationId xmlns:p14="http://schemas.microsoft.com/office/powerpoint/2010/main" val="3264840096"/>
       </p:ext>
     </p:extLst>
   </p:cSld>
@@ -5796,7 +6548,7 @@
       </p:grpSpPr>
       <p:sp>
         <p:nvSpPr>
-          <p:cNvPr id="2" name="Title 1"/>
+          <p:cNvPr id="6" name="Title 5"/>
           <p:cNvSpPr>
             <a:spLocks noGrp="1"/>
           </p:cNvSpPr>
@@ -5811,40 +6563,19 @@
           <a:p>
             <a:r>
               <a:rPr lang="en-US" dirty="0"/>
-              <a:t>Add PLOTS</a:t>
-            </a:r>
-          </a:p>
-        </p:txBody>
-      </p:sp>
-      <p:sp>
-        <p:nvSpPr>
-          <p:cNvPr id="7" name="Content Placeholder 6"/>
+              <a:t>Variance of a Gaussian – Quick Proof</a:t>
+            </a:r>
+          </a:p>
+        </p:txBody>
+      </p:sp>
+      <p:sp>
+        <p:nvSpPr>
+          <p:cNvPr id="4" name="Content Placeholder 3"/>
           <p:cNvSpPr>
             <a:spLocks noGrp="1"/>
           </p:cNvSpPr>
           <p:nvPr>
             <p:ph idx="1"/>
-          </p:nvPr>
-        </p:nvSpPr>
-        <p:spPr/>
-        <p:txBody>
-          <a:bodyPr>
-            <a:normAutofit/>
-          </a:bodyPr>
-          <a:lstStyle/>
-          <a:p>
-            <a:endParaRPr lang="en-US" dirty="0"/>
-          </a:p>
-        </p:txBody>
-      </p:sp>
-      <p:sp>
-        <p:nvSpPr>
-          <p:cNvPr id="4" name="Text Placeholder 3"/>
-          <p:cNvSpPr>
-            <a:spLocks noGrp="1"/>
-          </p:cNvSpPr>
-          <p:nvPr>
-            <p:ph type="body" sz="half" idx="2"/>
           </p:nvPr>
         </p:nvSpPr>
         <p:spPr/>
@@ -5852,14 +6583,146 @@
           <a:bodyPr/>
           <a:lstStyle/>
           <a:p>
+            <a:r>
+              <a:rPr lang="en-US" dirty="0"/>
+              <a:t>Expectation values are of the form:</a:t>
+            </a:r>
+          </a:p>
+          <a:p>
+            <a:r>
+              <a:rPr lang="en-US" dirty="0"/>
+              <a:t>Thus, after using the fact that we are dealing with an even function</a:t>
+            </a:r>
+          </a:p>
+          <a:p>
             <a:endParaRPr lang="en-US" dirty="0"/>
           </a:p>
-        </p:txBody>
-      </p:sp>
+          <a:p>
+            <a:endParaRPr lang="en-US" dirty="0"/>
+          </a:p>
+          <a:p>
+            <a:r>
+              <a:rPr lang="en-US" dirty="0"/>
+              <a:t>After a change of variable</a:t>
+            </a:r>
+          </a:p>
+          <a:p>
+            <a:endParaRPr lang="en-US" dirty="0"/>
+          </a:p>
+          <a:p>
+            <a:r>
+              <a:rPr lang="en-US" dirty="0"/>
+              <a:t>Finally, after integrating by parts: </a:t>
+            </a:r>
+          </a:p>
+          <a:p>
+            <a:endParaRPr lang="en-US" dirty="0"/>
+          </a:p>
+          <a:p>
+            <a:endParaRPr lang="en-US" dirty="0"/>
+          </a:p>
+        </p:txBody>
+      </p:sp>
+      <p:pic>
+        <p:nvPicPr>
+          <p:cNvPr id="2" name="Picture 1"/>
+          <p:cNvPicPr>
+            <a:picLocks noChangeAspect="1"/>
+          </p:cNvPicPr>
+          <p:nvPr/>
+        </p:nvPicPr>
+        <p:blipFill>
+          <a:blip r:embed="rId2"/>
+          <a:stretch>
+            <a:fillRect/>
+          </a:stretch>
+        </p:blipFill>
+        <p:spPr>
+          <a:xfrm>
+            <a:off x="6627812" y="1828800"/>
+            <a:ext cx="1924050" cy="638175"/>
+          </a:xfrm>
+          <a:prstGeom prst="rect">
+            <a:avLst/>
+          </a:prstGeom>
+        </p:spPr>
+      </p:pic>
+      <p:pic>
+        <p:nvPicPr>
+          <p:cNvPr id="3" name="Picture 2"/>
+          <p:cNvPicPr>
+            <a:picLocks noChangeAspect="1"/>
+          </p:cNvPicPr>
+          <p:nvPr/>
+        </p:nvPicPr>
+        <p:blipFill>
+          <a:blip r:embed="rId3"/>
+          <a:stretch>
+            <a:fillRect/>
+          </a:stretch>
+        </p:blipFill>
+        <p:spPr>
+          <a:xfrm>
+            <a:off x="2817812" y="2895600"/>
+            <a:ext cx="4457700" cy="1323975"/>
+          </a:xfrm>
+          <a:prstGeom prst="rect">
+            <a:avLst/>
+          </a:prstGeom>
+        </p:spPr>
+      </p:pic>
+      <p:pic>
+        <p:nvPicPr>
+          <p:cNvPr id="5" name="Picture 4"/>
+          <p:cNvPicPr>
+            <a:picLocks noChangeAspect="1"/>
+          </p:cNvPicPr>
+          <p:nvPr/>
+        </p:nvPicPr>
+        <p:blipFill>
+          <a:blip r:embed="rId4"/>
+          <a:stretch>
+            <a:fillRect/>
+          </a:stretch>
+        </p:blipFill>
+        <p:spPr>
+          <a:xfrm>
+            <a:off x="2817812" y="4552950"/>
+            <a:ext cx="3076575" cy="657225"/>
+          </a:xfrm>
+          <a:prstGeom prst="rect">
+            <a:avLst/>
+          </a:prstGeom>
+        </p:spPr>
+      </p:pic>
+      <p:pic>
+        <p:nvPicPr>
+          <p:cNvPr id="7" name="Picture 6"/>
+          <p:cNvPicPr>
+            <a:picLocks noChangeAspect="1"/>
+          </p:cNvPicPr>
+          <p:nvPr/>
+        </p:nvPicPr>
+        <p:blipFill>
+          <a:blip r:embed="rId5"/>
+          <a:stretch>
+            <a:fillRect/>
+          </a:stretch>
+        </p:blipFill>
+        <p:spPr>
+          <a:xfrm>
+            <a:off x="6094645" y="5257800"/>
+            <a:ext cx="1066800" cy="428625"/>
+          </a:xfrm>
+          <a:prstGeom prst="rect">
+            <a:avLst/>
+          </a:prstGeom>
+        </p:spPr>
+      </p:pic>
     </p:spTree>
     <p:extLst>
       <p:ext uri="{BB962C8B-B14F-4D97-AF65-F5344CB8AC3E}">
-        <p14:creationId xmlns:p14="http://schemas.microsoft.com/office/powerpoint/2010/main" val="1200765116"/>
+        <p14:creationId xmlns:p14="http://schemas.microsoft.com/office/powerpoint/2010/main" val="555153569"/>
       </p:ext>
     </p:extLst>
   </p:cSld>
@@ -5915,7 +6778,58 @@
           <a:p>
             <a:r>
               <a:rPr lang="en-US" dirty="0"/>
-              <a:t>Cluster Growth using DLA</a:t>
+              <a:t>Initial Distribution</a:t>
+            </a:r>
+          </a:p>
+        </p:txBody>
+      </p:sp>
+      <p:pic>
+        <p:nvPicPr>
+          <p:cNvPr id="5" name="Content Placeholder 4"/>
+          <p:cNvPicPr>
+            <a:picLocks noGrp="1" noChangeAspect="1"/>
+          </p:cNvPicPr>
+          <p:nvPr>
+            <p:ph idx="1"/>
+          </p:nvPr>
+        </p:nvPicPr>
+        <p:blipFill>
+          <a:blip r:embed="rId2">
+            <a:extLst>
+              <a:ext uri="{28A0092B-C50C-407E-A947-70E740481C1C}">
+                <a14:useLocalDpi xmlns:a14="http://schemas.microsoft.com/office/drawing/2010/main" val="0"/>
+              </a:ext>
+            </a:extLst>
+          </a:blip>
+          <a:stretch>
+            <a:fillRect/>
+          </a:stretch>
+        </p:blipFill>
+        <p:spPr>
+          <a:xfrm>
+            <a:off x="1598877" y="1293813"/>
+            <a:ext cx="5363633" cy="4022725"/>
+          </a:xfrm>
+        </p:spPr>
+      </p:pic>
+      <p:sp>
+        <p:nvSpPr>
+          <p:cNvPr id="4" name="Text Placeholder 3"/>
+          <p:cNvSpPr>
+            <a:spLocks noGrp="1"/>
+          </p:cNvSpPr>
+          <p:nvPr>
+            <p:ph type="body" sz="half" idx="2"/>
+          </p:nvPr>
+        </p:nvSpPr>
+        <p:spPr/>
+        <p:txBody>
+          <a:bodyPr/>
+          <a:lstStyle/>
+          <a:p>
+            <a:r>
+              <a:rPr lang="en-US" dirty="0"/>
+              <a:t>Important to put the box density far from the edges, otherwise you will affect the Gaussian and make it lopsided. </a:t>
             </a:r>
           </a:p>
         </p:txBody>
@@ -5923,7 +6837,7 @@
     </p:spTree>
     <p:extLst>
       <p:ext uri="{BB962C8B-B14F-4D97-AF65-F5344CB8AC3E}">
-        <p14:creationId xmlns:p14="http://schemas.microsoft.com/office/powerpoint/2010/main" val="2592630319"/>
+        <p14:creationId xmlns:p14="http://schemas.microsoft.com/office/powerpoint/2010/main" val="1200765116"/>
       </p:ext>
     </p:extLst>
   </p:cSld>

</xml_diff>

<commit_message>
Slides for question 3
</commit_message>
<xml_diff>
--- a/Presentation.pptx
+++ b/Presentation.pptx
@@ -5,10 +5,10 @@
     <p:sldMasterId id="2147483912" r:id="rId2"/>
   </p:sldMasterIdLst>
   <p:notesMasterIdLst>
-    <p:notesMasterId r:id="rId17"/>
+    <p:notesMasterId r:id="rId18"/>
   </p:notesMasterIdLst>
   <p:handoutMasterIdLst>
-    <p:handoutMasterId r:id="rId18"/>
+    <p:handoutMasterId r:id="rId19"/>
   </p:handoutMasterIdLst>
   <p:sldIdLst>
     <p:sldId id="256" r:id="rId3"/>
@@ -23,8 +23,9 @@
     <p:sldId id="284" r:id="rId12"/>
     <p:sldId id="275" r:id="rId13"/>
     <p:sldId id="279" r:id="rId14"/>
-    <p:sldId id="278" r:id="rId15"/>
-    <p:sldId id="280" r:id="rId16"/>
+    <p:sldId id="285" r:id="rId15"/>
+    <p:sldId id="286" r:id="rId16"/>
+    <p:sldId id="280" r:id="rId17"/>
   </p:sldIdLst>
   <p:sldSz cx="12188825" cy="6858000"/>
   <p:notesSz cx="6858000" cy="9144000"/>
@@ -238,7 +239,7 @@
           <a:p>
             <a:fld id="{BEA74EB7-856E-45FD-83F0-5F7C6F3E4372}" type="datetimeFigureOut">
               <a:rPr lang="en-US"/>
-              <a:t>3/22/2017</a:t>
+              <a:t>3/23/17</a:t>
             </a:fld>
             <a:endParaRPr/>
           </a:p>
@@ -403,7 +404,7 @@
           <a:p>
             <a:fld id="{C61B0E40-8125-41F8-BB6C-139D8D531A4F}" type="datetimeFigureOut">
               <a:rPr lang="en-US"/>
-              <a:t>3/22/2017</a:t>
+              <a:t>3/23/17</a:t>
             </a:fld>
             <a:endParaRPr/>
           </a:p>
@@ -1309,7 +1310,7 @@
             <a:fld id="{8E36636D-D922-432D-A958-524484B5923D}" type="datetimeFigureOut">
               <a:rPr lang="en-US"/>
               <a:pPr/>
-              <a:t>3/22/2017</a:t>
+              <a:t>3/23/17</a:t>
             </a:fld>
             <a:endParaRPr/>
           </a:p>
@@ -1509,7 +1510,7 @@
             <a:fld id="{8E36636D-D922-432D-A958-524484B5923D}" type="datetimeFigureOut">
               <a:rPr lang="en-US"/>
               <a:pPr/>
-              <a:t>3/22/2017</a:t>
+              <a:t>3/23/17</a:t>
             </a:fld>
             <a:endParaRPr/>
           </a:p>
@@ -1719,7 +1720,7 @@
             <a:fld id="{8E36636D-D922-432D-A958-524484B5923D}" type="datetimeFigureOut">
               <a:rPr lang="en-US"/>
               <a:pPr/>
-              <a:t>3/22/2017</a:t>
+              <a:t>3/23/17</a:t>
             </a:fld>
             <a:endParaRPr/>
           </a:p>
@@ -1909,7 +1910,7 @@
             <a:fld id="{8E36636D-D922-432D-A958-524484B5923D}" type="datetimeFigureOut">
               <a:rPr lang="en-US"/>
               <a:pPr/>
-              <a:t>3/22/2017</a:t>
+              <a:t>3/23/17</a:t>
             </a:fld>
             <a:endParaRPr/>
           </a:p>
@@ -2182,7 +2183,7 @@
             <a:fld id="{8E36636D-D922-432D-A958-524484B5923D}" type="datetimeFigureOut">
               <a:rPr lang="en-US"/>
               <a:pPr/>
-              <a:t>3/22/2017</a:t>
+              <a:t>3/23/17</a:t>
             </a:fld>
             <a:endParaRPr/>
           </a:p>
@@ -2504,7 +2505,7 @@
             <a:fld id="{8E36636D-D922-432D-A958-524484B5923D}" type="datetimeFigureOut">
               <a:rPr lang="en-US"/>
               <a:pPr/>
-              <a:t>3/22/2017</a:t>
+              <a:t>3/23/17</a:t>
             </a:fld>
             <a:endParaRPr/>
           </a:p>
@@ -2954,7 +2955,7 @@
             <a:fld id="{8E36636D-D922-432D-A958-524484B5923D}" type="datetimeFigureOut">
               <a:rPr lang="en-US"/>
               <a:pPr/>
-              <a:t>3/22/2017</a:t>
+              <a:t>3/23/17</a:t>
             </a:fld>
             <a:endParaRPr/>
           </a:p>
@@ -3086,7 +3087,7 @@
             <a:fld id="{8E36636D-D922-432D-A958-524484B5923D}" type="datetimeFigureOut">
               <a:rPr lang="en-US"/>
               <a:pPr/>
-              <a:t>3/22/2017</a:t>
+              <a:t>3/23/17</a:t>
             </a:fld>
             <a:endParaRPr/>
           </a:p>
@@ -3348,7 +3349,7 @@
             <a:fld id="{8E36636D-D922-432D-A958-524484B5923D}" type="datetimeFigureOut">
               <a:rPr lang="en-US"/>
               <a:pPr/>
-              <a:t>3/22/2017</a:t>
+              <a:t>3/23/17</a:t>
             </a:fld>
             <a:endParaRPr/>
           </a:p>
@@ -3695,7 +3696,7 @@
             <a:fld id="{8E36636D-D922-432D-A958-524484B5923D}" type="datetimeFigureOut">
               <a:rPr lang="en-US"/>
               <a:pPr/>
-              <a:t>3/22/2017</a:t>
+              <a:t>3/23/17</a:t>
             </a:fld>
             <a:endParaRPr/>
           </a:p>
@@ -4030,7 +4031,7 @@
             <a:fld id="{8E36636D-D922-432D-A958-524484B5923D}" type="datetimeFigureOut">
               <a:rPr lang="en-US"/>
               <a:pPr/>
-              <a:t>3/22/2017</a:t>
+              <a:t>3/23/17</a:t>
             </a:fld>
             <a:endParaRPr/>
           </a:p>
@@ -4561,7 +4562,7 @@
             <a:fld id="{8E36636D-D922-432D-A958-524484B5923D}" type="datetimeFigureOut">
               <a:rPr lang="en-US"/>
               <a:pPr/>
-              <a:t>3/22/2017</a:t>
+              <a:t>3/23/17</a:t>
             </a:fld>
             <a:endParaRPr/>
           </a:p>
@@ -5156,7 +5157,7 @@
         <p:spPr/>
         <p:txBody>
           <a:bodyPr>
-            <a:normAutofit lnSpcReduction="10000"/>
+            <a:normAutofit fontScale="92500" lnSpcReduction="20000"/>
           </a:bodyPr>
           <a:lstStyle/>
           <a:p>
@@ -5438,37 +5439,671 @@
             <p:ph type="title"/>
           </p:nvPr>
         </p:nvSpPr>
-        <p:spPr/>
+        <p:spPr>
+          <a:xfrm>
+            <a:off x="1065212" y="609600"/>
+            <a:ext cx="9143538" cy="1066800"/>
+          </a:xfrm>
+        </p:spPr>
         <p:txBody>
           <a:bodyPr/>
           <a:lstStyle/>
           <a:p>
             <a:r>
-              <a:rPr lang="en-US" dirty="0"/>
-              <a:t>ADD STUFF HERE</a:t>
-            </a:r>
-          </a:p>
-        </p:txBody>
-      </p:sp>
-      <p:sp>
-        <p:nvSpPr>
-          <p:cNvPr id="4" name="Content Placeholder 3"/>
-          <p:cNvSpPr>
-            <a:spLocks noGrp="1"/>
-          </p:cNvSpPr>
+              <a:rPr lang="en-US" dirty="0" smtClean="0"/>
+              <a:t>DLA Cluster</a:t>
+            </a:r>
+            <a:endParaRPr lang="en-US" dirty="0"/>
+          </a:p>
+        </p:txBody>
+      </p:sp>
+      <p:pic>
+        <p:nvPicPr>
+          <p:cNvPr id="2" name="Content Placeholder 1"/>
+          <p:cNvPicPr>
+            <a:picLocks noGrp="1" noChangeAspect="1"/>
+          </p:cNvPicPr>
           <p:nvPr>
             <p:ph idx="1"/>
           </p:nvPr>
-        </p:nvSpPr>
-        <p:spPr/>
-        <p:txBody>
-          <a:bodyPr/>
+        </p:nvPicPr>
+        <p:blipFill>
+          <a:blip r:embed="rId2">
+            <a:extLst>
+              <a:ext uri="{28A0092B-C50C-407E-A947-70E740481C1C}">
+                <a14:useLocalDpi xmlns:a14="http://schemas.microsoft.com/office/drawing/2010/main" val="0"/>
+              </a:ext>
+            </a:extLst>
+          </a:blip>
+          <a:stretch>
+            <a:fillRect/>
+          </a:stretch>
+        </p:blipFill>
+        <p:spPr>
+          <a:xfrm>
+            <a:off x="5865812" y="381000"/>
+            <a:ext cx="5867399" cy="5867399"/>
+          </a:xfrm>
+        </p:spPr>
+      </p:pic>
+      <p:sp>
+        <p:nvSpPr>
+          <p:cNvPr id="3" name="TextBox 2"/>
+          <p:cNvSpPr txBox="1"/>
+          <p:nvPr/>
+        </p:nvSpPr>
+        <p:spPr>
+          <a:xfrm>
+            <a:off x="1065212" y="1905000"/>
+            <a:ext cx="4571769" cy="757130"/>
+          </a:xfrm>
+          <a:prstGeom prst="rect">
+            <a:avLst/>
+          </a:prstGeom>
+          <a:noFill/>
+        </p:spPr>
+        <p:txBody>
+          <a:bodyPr wrap="square" rtlCol="0">
+            <a:spAutoFit/>
+          </a:bodyPr>
           <a:lstStyle/>
           <a:p>
-            <a:endParaRPr lang="en-US"/>
-          </a:p>
-        </p:txBody>
-      </p:sp>
+            <a:pPr>
+              <a:lnSpc>
+                <a:spcPct val="90000"/>
+              </a:lnSpc>
+            </a:pPr>
+            <a:r>
+              <a:rPr lang="en-US" sz="2400" dirty="0" smtClean="0"/>
+              <a:t>Many large open spaces, irregular perimeter</a:t>
+            </a:r>
+            <a:endParaRPr lang="en-US" sz="2400" dirty="0"/>
+          </a:p>
+        </p:txBody>
+      </p:sp>
+      <mc:AlternateContent xmlns:mc="http://schemas.openxmlformats.org/markup-compatibility/2006">
+        <mc:Choice xmlns:a14="http://schemas.microsoft.com/office/drawing/2010/main" Requires="a14">
+          <p:sp>
+            <p:nvSpPr>
+              <p:cNvPr id="7" name="TextBox 6"/>
+              <p:cNvSpPr txBox="1"/>
+              <p:nvPr/>
+            </p:nvSpPr>
+            <p:spPr>
+              <a:xfrm>
+                <a:off x="2149088" y="2945176"/>
+                <a:ext cx="1936299" cy="463268"/>
+              </a:xfrm>
+              <a:prstGeom prst="rect">
+                <a:avLst/>
+              </a:prstGeom>
+              <a:noFill/>
+            </p:spPr>
+            <p:txBody>
+              <a:bodyPr wrap="none" lIns="0" tIns="0" rIns="0" bIns="0" rtlCol="0">
+                <a:spAutoFit/>
+              </a:bodyPr>
+              <a:lstStyle/>
+              <a:p>
+                <a:pPr>
+                  <a:lnSpc>
+                    <a:spcPct val="90000"/>
+                  </a:lnSpc>
+                </a:pPr>
+                <a14:m>
+                  <m:oMathPara xmlns:m="http://schemas.openxmlformats.org/officeDocument/2006/math">
+                    <m:oMathParaPr>
+                      <m:jc m:val="centerGroup"/>
+                    </m:oMathParaPr>
+                    <m:oMath xmlns:m="http://schemas.openxmlformats.org/officeDocument/2006/math">
+                      <m:r>
+                        <m:rPr>
+                          <m:nor/>
+                        </m:rPr>
+                        <a:rPr lang="en-US" sz="3200" dirty="0" smtClean="0"/>
+                        <m:t>m</m:t>
+                      </m:r>
+                      <m:r>
+                        <m:rPr>
+                          <m:nor/>
+                        </m:rPr>
+                        <a:rPr lang="en-US" sz="3200" dirty="0" smtClean="0"/>
+                        <m:t>(</m:t>
+                      </m:r>
+                      <m:r>
+                        <m:rPr>
+                          <m:nor/>
+                        </m:rPr>
+                        <a:rPr lang="en-US" sz="3200" dirty="0" smtClean="0"/>
+                        <m:t>r</m:t>
+                      </m:r>
+                      <m:r>
+                        <m:rPr>
+                          <m:nor/>
+                        </m:rPr>
+                        <a:rPr lang="en-US" sz="3200" dirty="0" smtClean="0"/>
+                        <m:t>)</m:t>
+                      </m:r>
+                      <m:r>
+                        <a:rPr lang="en-US" sz="3200" b="0" i="1" dirty="0" smtClean="0">
+                          <a:latin typeface="Cambria Math" charset="0"/>
+                        </a:rPr>
+                        <m:t>~</m:t>
+                      </m:r>
+                      <m:sSup>
+                        <m:sSupPr>
+                          <m:ctrlPr>
+                            <a:rPr lang="en-US" sz="3200" b="0" i="1" dirty="0" smtClean="0">
+                              <a:latin typeface="Cambria Math" charset="0"/>
+                              <a:ea typeface="Cambria Math" charset="0"/>
+                              <a:cs typeface="Cambria Math" charset="0"/>
+                            </a:rPr>
+                          </m:ctrlPr>
+                        </m:sSupPr>
+                        <m:e>
+                          <m:r>
+                            <a:rPr lang="en-US" sz="3200" b="0" i="1" dirty="0" smtClean="0">
+                              <a:latin typeface="Cambria Math" charset="0"/>
+                              <a:ea typeface="Cambria Math" charset="0"/>
+                              <a:cs typeface="Cambria Math" charset="0"/>
+                            </a:rPr>
+                            <m:t>𝑟</m:t>
+                          </m:r>
+                        </m:e>
+                        <m:sup>
+                          <m:sSub>
+                            <m:sSubPr>
+                              <m:ctrlPr>
+                                <a:rPr lang="en-US" sz="3200" b="0" i="1" dirty="0" smtClean="0">
+                                  <a:latin typeface="Cambria Math" charset="0"/>
+                                  <a:ea typeface="Cambria Math" charset="0"/>
+                                  <a:cs typeface="Cambria Math" charset="0"/>
+                                </a:rPr>
+                              </m:ctrlPr>
+                            </m:sSubPr>
+                            <m:e>
+                              <m:r>
+                                <a:rPr lang="en-US" sz="3200" b="0" i="1" dirty="0" smtClean="0">
+                                  <a:latin typeface="Cambria Math" charset="0"/>
+                                  <a:ea typeface="Cambria Math" charset="0"/>
+                                  <a:cs typeface="Cambria Math" charset="0"/>
+                                </a:rPr>
+                                <m:t>𝑑</m:t>
+                              </m:r>
+                            </m:e>
+                            <m:sub>
+                              <m:r>
+                                <a:rPr lang="en-US" sz="3200" b="0" i="1" dirty="0" smtClean="0">
+                                  <a:latin typeface="Cambria Math" charset="0"/>
+                                  <a:ea typeface="Cambria Math" charset="0"/>
+                                  <a:cs typeface="Cambria Math" charset="0"/>
+                                </a:rPr>
+                                <m:t>𝑓</m:t>
+                              </m:r>
+                            </m:sub>
+                          </m:sSub>
+                        </m:sup>
+                      </m:sSup>
+                      <m:r>
+                        <a:rPr lang="en-US" sz="3200" b="0" i="1" dirty="0" smtClean="0">
+                          <a:latin typeface="Cambria Math" charset="0"/>
+                          <a:ea typeface="Cambria Math" charset="0"/>
+                          <a:cs typeface="Cambria Math" charset="0"/>
+                        </a:rPr>
+                        <m:t> </m:t>
+                      </m:r>
+                    </m:oMath>
+                  </m:oMathPara>
+                </a14:m>
+                <a:endParaRPr lang="en-US" sz="3200" dirty="0"/>
+              </a:p>
+            </p:txBody>
+          </p:sp>
+        </mc:Choice>
+        <mc:Fallback>
+          <p:sp>
+            <p:nvSpPr>
+              <p:cNvPr id="7" name="TextBox 6"/>
+              <p:cNvSpPr txBox="1">
+                <a:spLocks noRot="1" noChangeAspect="1" noMove="1" noResize="1" noEditPoints="1" noAdjustHandles="1" noChangeArrowheads="1" noChangeShapeType="1" noTextEdit="1"/>
+              </p:cNvSpPr>
+              <p:nvPr/>
+            </p:nvSpPr>
+            <p:spPr>
+              <a:xfrm>
+                <a:off x="2149088" y="2945176"/>
+                <a:ext cx="1936299" cy="463268"/>
+              </a:xfrm>
+              <a:prstGeom prst="rect">
+                <a:avLst/>
+              </a:prstGeom>
+              <a:blipFill rotWithShape="0">
+                <a:blip r:embed="rId3"/>
+                <a:stretch>
+                  <a:fillRect/>
+                </a:stretch>
+              </a:blipFill>
+            </p:spPr>
+            <p:txBody>
+              <a:bodyPr/>
+              <a:lstStyle/>
+              <a:p>
+                <a:r>
+                  <a:rPr lang="en-US">
+                    <a:noFill/>
+                  </a:rPr>
+                  <a:t> </a:t>
+                </a:r>
+              </a:p>
+            </p:txBody>
+          </p:sp>
+        </mc:Fallback>
+      </mc:AlternateContent>
+      <mc:AlternateContent xmlns:mc="http://schemas.openxmlformats.org/markup-compatibility/2006">
+        <mc:Choice xmlns:a14="http://schemas.microsoft.com/office/drawing/2010/main" Requires="a14">
+          <p:sp>
+            <p:nvSpPr>
+              <p:cNvPr id="8" name="TextBox 7"/>
+              <p:cNvSpPr txBox="1"/>
+              <p:nvPr/>
+            </p:nvSpPr>
+            <p:spPr>
+              <a:xfrm>
+                <a:off x="1080557" y="3764143"/>
+                <a:ext cx="4073359" cy="359073"/>
+              </a:xfrm>
+              <a:prstGeom prst="rect">
+                <a:avLst/>
+              </a:prstGeom>
+              <a:noFill/>
+            </p:spPr>
+            <p:txBody>
+              <a:bodyPr wrap="none" lIns="0" tIns="0" rIns="0" bIns="0" rtlCol="0">
+                <a:spAutoFit/>
+              </a:bodyPr>
+              <a:lstStyle/>
+              <a:p>
+                <a:pPr>
+                  <a:lnSpc>
+                    <a:spcPct val="90000"/>
+                  </a:lnSpc>
+                </a:pPr>
+                <a14:m>
+                  <m:oMathPara xmlns:m="http://schemas.openxmlformats.org/officeDocument/2006/math">
+                    <m:oMathParaPr>
+                      <m:jc m:val="centerGroup"/>
+                    </m:oMathParaPr>
+                    <m:oMath xmlns:m="http://schemas.openxmlformats.org/officeDocument/2006/math">
+                      <m:sSub>
+                        <m:sSubPr>
+                          <m:ctrlPr>
+                            <a:rPr lang="en-US" sz="2400" b="0" i="1" smtClean="0">
+                              <a:latin typeface="Cambria Math" charset="0"/>
+                            </a:rPr>
+                          </m:ctrlPr>
+                        </m:sSubPr>
+                        <m:e>
+                          <m:r>
+                            <a:rPr lang="en-US" sz="2400" b="0" i="1" smtClean="0">
+                              <a:latin typeface="Cambria Math" charset="0"/>
+                            </a:rPr>
+                            <m:t>𝑑</m:t>
+                          </m:r>
+                        </m:e>
+                        <m:sub>
+                          <m:r>
+                            <a:rPr lang="en-US" sz="2400" b="0" i="1" smtClean="0">
+                              <a:latin typeface="Cambria Math" charset="0"/>
+                            </a:rPr>
+                            <m:t>𝑓</m:t>
+                          </m:r>
+                        </m:sub>
+                      </m:sSub>
+                      <m:r>
+                        <a:rPr lang="en-US" sz="2400" b="0" i="1" smtClean="0">
+                          <a:latin typeface="Cambria Math" charset="0"/>
+                        </a:rPr>
+                        <m:t>=</m:t>
+                      </m:r>
+                      <m:r>
+                        <a:rPr lang="en-US" sz="2400" b="0" i="1" smtClean="0">
+                          <a:latin typeface="Cambria Math" charset="0"/>
+                        </a:rPr>
+                        <m:t>𝑓𝑟𝑎𝑐𝑡𝑎𝑙</m:t>
+                      </m:r>
+                      <m:r>
+                        <a:rPr lang="en-US" sz="2400" b="0" i="1" smtClean="0">
+                          <a:latin typeface="Cambria Math" charset="0"/>
+                        </a:rPr>
+                        <m:t> </m:t>
+                      </m:r>
+                      <m:r>
+                        <a:rPr lang="en-US" sz="2400" b="0" i="1" smtClean="0">
+                          <a:latin typeface="Cambria Math" charset="0"/>
+                        </a:rPr>
+                        <m:t>𝑑𝑖𝑚𝑒𝑛𝑠𝑖𝑜𝑛𝑎𝑙𝑖𝑡𝑦</m:t>
+                      </m:r>
+                    </m:oMath>
+                  </m:oMathPara>
+                </a14:m>
+                <a:endParaRPr lang="en-US" sz="2400" dirty="0"/>
+              </a:p>
+            </p:txBody>
+          </p:sp>
+        </mc:Choice>
+        <mc:Fallback>
+          <p:sp>
+            <p:nvSpPr>
+              <p:cNvPr id="8" name="TextBox 7"/>
+              <p:cNvSpPr txBox="1">
+                <a:spLocks noRot="1" noChangeAspect="1" noMove="1" noResize="1" noEditPoints="1" noAdjustHandles="1" noChangeArrowheads="1" noChangeShapeType="1" noTextEdit="1"/>
+              </p:cNvSpPr>
+              <p:nvPr/>
+            </p:nvSpPr>
+            <p:spPr>
+              <a:xfrm>
+                <a:off x="1080557" y="3764143"/>
+                <a:ext cx="4073359" cy="359073"/>
+              </a:xfrm>
+              <a:prstGeom prst="rect">
+                <a:avLst/>
+              </a:prstGeom>
+              <a:blipFill rotWithShape="0">
+                <a:blip r:embed="rId4"/>
+                <a:stretch>
+                  <a:fillRect l="-299" t="-152542" r="-1048" b="-177966"/>
+                </a:stretch>
+              </a:blipFill>
+            </p:spPr>
+            <p:txBody>
+              <a:bodyPr/>
+              <a:lstStyle/>
+              <a:p>
+                <a:r>
+                  <a:rPr lang="en-US">
+                    <a:noFill/>
+                  </a:rPr>
+                  <a:t> </a:t>
+                </a:r>
+              </a:p>
+            </p:txBody>
+          </p:sp>
+        </mc:Fallback>
+      </mc:AlternateContent>
+      <mc:AlternateContent xmlns:mc="http://schemas.openxmlformats.org/markup-compatibility/2006">
+        <mc:Choice xmlns:a14="http://schemas.microsoft.com/office/drawing/2010/main" Requires="a14">
+          <p:sp>
+            <p:nvSpPr>
+              <p:cNvPr id="9" name="TextBox 8"/>
+              <p:cNvSpPr txBox="1"/>
+              <p:nvPr/>
+            </p:nvSpPr>
+            <p:spPr>
+              <a:xfrm>
+                <a:off x="1827212" y="4485105"/>
+                <a:ext cx="2441694" cy="299184"/>
+              </a:xfrm>
+              <a:prstGeom prst="rect">
+                <a:avLst/>
+              </a:prstGeom>
+              <a:noFill/>
+            </p:spPr>
+            <p:txBody>
+              <a:bodyPr wrap="none" lIns="0" tIns="0" rIns="0" bIns="0" rtlCol="0">
+                <a:spAutoFit/>
+              </a:bodyPr>
+              <a:lstStyle/>
+              <a:p>
+                <a:pPr>
+                  <a:lnSpc>
+                    <a:spcPct val="90000"/>
+                  </a:lnSpc>
+                </a:pPr>
+                <a14:m>
+                  <m:oMathPara xmlns:m="http://schemas.openxmlformats.org/officeDocument/2006/math">
+                    <m:oMathParaPr>
+                      <m:jc m:val="centerGroup"/>
+                    </m:oMathParaPr>
+                    <m:oMath xmlns:m="http://schemas.openxmlformats.org/officeDocument/2006/math">
+                      <m:sSub>
+                        <m:sSubPr>
+                          <m:ctrlPr>
+                            <a:rPr lang="en-US" sz="2000" b="0" i="1" smtClean="0">
+                              <a:latin typeface="Cambria Math" charset="0"/>
+                            </a:rPr>
+                          </m:ctrlPr>
+                        </m:sSubPr>
+                        <m:e>
+                          <m:r>
+                            <a:rPr lang="en-US" sz="2000" b="0" i="1" smtClean="0">
+                              <a:latin typeface="Cambria Math" charset="0"/>
+                            </a:rPr>
+                            <m:t>𝑑</m:t>
+                          </m:r>
+                        </m:e>
+                        <m:sub>
+                          <m:r>
+                            <a:rPr lang="en-US" sz="2000" b="0" i="1" smtClean="0">
+                              <a:latin typeface="Cambria Math" charset="0"/>
+                            </a:rPr>
+                            <m:t>𝑓</m:t>
+                          </m:r>
+                        </m:sub>
+                      </m:sSub>
+                      <m:r>
+                        <a:rPr lang="en-US" sz="2000" b="0" i="1" smtClean="0">
+                          <a:latin typeface="Cambria Math" charset="0"/>
+                        </a:rPr>
+                        <m:t>=1 </m:t>
+                      </m:r>
+                      <m:r>
+                        <a:rPr lang="en-US" sz="2000" b="0" i="1" smtClean="0">
+                          <a:latin typeface="Cambria Math" charset="0"/>
+                        </a:rPr>
+                        <m:t>𝑙𝑖𝑛𝑒</m:t>
+                      </m:r>
+                      <m:r>
+                        <a:rPr lang="en-US" sz="2000" b="0" i="1" smtClean="0">
+                          <a:latin typeface="Cambria Math" charset="0"/>
+                        </a:rPr>
+                        <m:t>, </m:t>
+                      </m:r>
+                      <m:r>
+                        <a:rPr lang="en-US" sz="2000" b="0" i="1" smtClean="0">
+                          <a:latin typeface="Cambria Math" charset="0"/>
+                        </a:rPr>
+                        <m:t>𝑜𝑟</m:t>
+                      </m:r>
+                      <m:r>
+                        <a:rPr lang="en-US" sz="2000" b="0" i="1" smtClean="0">
+                          <a:latin typeface="Cambria Math" charset="0"/>
+                        </a:rPr>
+                        <m:t> </m:t>
+                      </m:r>
+                      <m:r>
+                        <a:rPr lang="en-US" sz="2000" b="0" i="1" smtClean="0">
+                          <a:latin typeface="Cambria Math" charset="0"/>
+                        </a:rPr>
+                        <m:t>𝑐𝑢𝑟𝑣𝑒</m:t>
+                      </m:r>
+                    </m:oMath>
+                  </m:oMathPara>
+                </a14:m>
+                <a:endParaRPr lang="en-US" sz="2000" dirty="0"/>
+              </a:p>
+            </p:txBody>
+          </p:sp>
+        </mc:Choice>
+        <mc:Fallback>
+          <p:sp>
+            <p:nvSpPr>
+              <p:cNvPr id="9" name="TextBox 8"/>
+              <p:cNvSpPr txBox="1">
+                <a:spLocks noRot="1" noChangeAspect="1" noMove="1" noResize="1" noEditPoints="1" noAdjustHandles="1" noChangeArrowheads="1" noChangeShapeType="1" noTextEdit="1"/>
+              </p:cNvSpPr>
+              <p:nvPr/>
+            </p:nvSpPr>
+            <p:spPr>
+              <a:xfrm>
+                <a:off x="1827212" y="4485105"/>
+                <a:ext cx="2441694" cy="299184"/>
+              </a:xfrm>
+              <a:prstGeom prst="rect">
+                <a:avLst/>
+              </a:prstGeom>
+              <a:blipFill rotWithShape="0">
+                <a:blip r:embed="rId5"/>
+                <a:stretch>
+                  <a:fillRect l="-1000" t="-155102" b="-179592"/>
+                </a:stretch>
+              </a:blipFill>
+            </p:spPr>
+            <p:txBody>
+              <a:bodyPr/>
+              <a:lstStyle/>
+              <a:p>
+                <a:r>
+                  <a:rPr lang="en-US">
+                    <a:noFill/>
+                  </a:rPr>
+                  <a:t> </a:t>
+                </a:r>
+              </a:p>
+            </p:txBody>
+          </p:sp>
+        </mc:Fallback>
+      </mc:AlternateContent>
+      <mc:AlternateContent xmlns:mc="http://schemas.openxmlformats.org/markup-compatibility/2006">
+        <mc:Choice xmlns:a14="http://schemas.microsoft.com/office/drawing/2010/main" Requires="a14">
+          <p:sp>
+            <p:nvSpPr>
+              <p:cNvPr id="10" name="TextBox 9"/>
+              <p:cNvSpPr txBox="1"/>
+              <p:nvPr/>
+            </p:nvSpPr>
+            <p:spPr>
+              <a:xfrm>
+                <a:off x="2015133" y="5146178"/>
+                <a:ext cx="2052998" cy="299184"/>
+              </a:xfrm>
+              <a:prstGeom prst="rect">
+                <a:avLst/>
+              </a:prstGeom>
+              <a:noFill/>
+            </p:spPr>
+            <p:txBody>
+              <a:bodyPr wrap="none" lIns="0" tIns="0" rIns="0" bIns="0" rtlCol="0">
+                <a:spAutoFit/>
+              </a:bodyPr>
+              <a:lstStyle/>
+              <a:p>
+                <a:pPr>
+                  <a:lnSpc>
+                    <a:spcPct val="90000"/>
+                  </a:lnSpc>
+                </a:pPr>
+                <a14:m>
+                  <m:oMathPara xmlns:m="http://schemas.openxmlformats.org/officeDocument/2006/math">
+                    <m:oMathParaPr>
+                      <m:jc m:val="centerGroup"/>
+                    </m:oMathParaPr>
+                    <m:oMath xmlns:m="http://schemas.openxmlformats.org/officeDocument/2006/math">
+                      <m:sSub>
+                        <m:sSubPr>
+                          <m:ctrlPr>
+                            <a:rPr lang="en-US" sz="2000" b="0" i="1" smtClean="0">
+                              <a:latin typeface="Cambria Math" charset="0"/>
+                            </a:rPr>
+                          </m:ctrlPr>
+                        </m:sSubPr>
+                        <m:e>
+                          <m:r>
+                            <a:rPr lang="en-US" sz="2000" b="0" i="1" smtClean="0">
+                              <a:latin typeface="Cambria Math" charset="0"/>
+                            </a:rPr>
+                            <m:t>𝑑</m:t>
+                          </m:r>
+                        </m:e>
+                        <m:sub>
+                          <m:r>
+                            <a:rPr lang="en-US" sz="2000" b="0" i="1" smtClean="0">
+                              <a:latin typeface="Cambria Math" charset="0"/>
+                            </a:rPr>
+                            <m:t>𝑓</m:t>
+                          </m:r>
+                        </m:sub>
+                      </m:sSub>
+                      <m:r>
+                        <a:rPr lang="en-US" sz="2000" b="0" i="1" smtClean="0">
+                          <a:latin typeface="Cambria Math" charset="0"/>
+                        </a:rPr>
+                        <m:t>=2 </m:t>
+                      </m:r>
+                      <m:r>
+                        <a:rPr lang="en-US" sz="2000" b="0" i="1" smtClean="0">
+                          <a:latin typeface="Cambria Math" charset="0"/>
+                        </a:rPr>
+                        <m:t>𝑠𝑜𝑙𝑖𝑑</m:t>
+                      </m:r>
+                      <m:r>
+                        <a:rPr lang="en-US" sz="2000" b="0" i="1" smtClean="0">
+                          <a:latin typeface="Cambria Math" charset="0"/>
+                        </a:rPr>
+                        <m:t> </m:t>
+                      </m:r>
+                      <m:r>
+                        <a:rPr lang="en-US" sz="2000" b="0" i="1" smtClean="0">
+                          <a:latin typeface="Cambria Math" charset="0"/>
+                        </a:rPr>
+                        <m:t>𝑑𝑖𝑠𝑘</m:t>
+                      </m:r>
+                    </m:oMath>
+                  </m:oMathPara>
+                </a14:m>
+                <a:endParaRPr lang="en-US" sz="2000" dirty="0"/>
+              </a:p>
+            </p:txBody>
+          </p:sp>
+        </mc:Choice>
+        <mc:Fallback>
+          <p:sp>
+            <p:nvSpPr>
+              <p:cNvPr id="10" name="TextBox 9"/>
+              <p:cNvSpPr txBox="1">
+                <a:spLocks noRot="1" noChangeAspect="1" noMove="1" noResize="1" noEditPoints="1" noAdjustHandles="1" noChangeArrowheads="1" noChangeShapeType="1" noTextEdit="1"/>
+              </p:cNvSpPr>
+              <p:nvPr/>
+            </p:nvSpPr>
+            <p:spPr>
+              <a:xfrm>
+                <a:off x="2015133" y="5146178"/>
+                <a:ext cx="2052998" cy="299184"/>
+              </a:xfrm>
+              <a:prstGeom prst="rect">
+                <a:avLst/>
+              </a:prstGeom>
+              <a:blipFill rotWithShape="0">
+                <a:blip r:embed="rId6"/>
+                <a:stretch>
+                  <a:fillRect l="-1190" t="-155102" r="-595" b="-179592"/>
+                </a:stretch>
+              </a:blipFill>
+            </p:spPr>
+            <p:txBody>
+              <a:bodyPr/>
+              <a:lstStyle/>
+              <a:p>
+                <a:r>
+                  <a:rPr lang="en-US">
+                    <a:noFill/>
+                  </a:rPr>
+                  <a:t> </a:t>
+                </a:r>
+              </a:p>
+            </p:txBody>
+          </p:sp>
+        </mc:Fallback>
+      </mc:AlternateContent>
     </p:spTree>
     <p:extLst>
       <p:ext uri="{BB962C8B-B14F-4D97-AF65-F5344CB8AC3E}">
@@ -5511,6 +6146,66 @@
           <a:chExt cx="0" cy="0"/>
         </a:xfrm>
       </p:grpSpPr>
+      <p:pic>
+        <p:nvPicPr>
+          <p:cNvPr id="7" name="Picture 6"/>
+          <p:cNvPicPr>
+            <a:picLocks noChangeAspect="1"/>
+          </p:cNvPicPr>
+          <p:nvPr/>
+        </p:nvPicPr>
+        <p:blipFill>
+          <a:blip r:embed="rId2">
+            <a:extLst>
+              <a:ext uri="{28A0092B-C50C-407E-A947-70E740481C1C}">
+                <a14:useLocalDpi xmlns:a14="http://schemas.microsoft.com/office/drawing/2010/main" val="0"/>
+              </a:ext>
+            </a:extLst>
+          </a:blip>
+          <a:stretch>
+            <a:fillRect/>
+          </a:stretch>
+        </p:blipFill>
+        <p:spPr>
+          <a:xfrm>
+            <a:off x="7770812" y="1295400"/>
+            <a:ext cx="4267200" cy="4267200"/>
+          </a:xfrm>
+          <a:prstGeom prst="rect">
+            <a:avLst/>
+          </a:prstGeom>
+        </p:spPr>
+      </p:pic>
+      <p:pic>
+        <p:nvPicPr>
+          <p:cNvPr id="5" name="Picture 4"/>
+          <p:cNvPicPr>
+            <a:picLocks noChangeAspect="1"/>
+          </p:cNvPicPr>
+          <p:nvPr/>
+        </p:nvPicPr>
+        <p:blipFill>
+          <a:blip r:embed="rId3">
+            <a:extLst>
+              <a:ext uri="{28A0092B-C50C-407E-A947-70E740481C1C}">
+                <a14:useLocalDpi xmlns:a14="http://schemas.microsoft.com/office/drawing/2010/main" val="0"/>
+              </a:ext>
+            </a:extLst>
+          </a:blip>
+          <a:stretch>
+            <a:fillRect/>
+          </a:stretch>
+        </p:blipFill>
+        <p:spPr>
+          <a:xfrm>
+            <a:off x="3884612" y="1295400"/>
+            <a:ext cx="4267200" cy="4267200"/>
+          </a:xfrm>
+          <a:prstGeom prst="rect">
+            <a:avLst/>
+          </a:prstGeom>
+        </p:spPr>
+      </p:pic>
       <p:sp>
         <p:nvSpPr>
           <p:cNvPr id="2" name="Title 1"/>
@@ -5526,57 +6221,43 @@
           <a:bodyPr/>
           <a:lstStyle/>
           <a:p>
-            <a:r>
-              <a:rPr lang="en-US" dirty="0"/>
-              <a:t>Add PLOTS</a:t>
-            </a:r>
-          </a:p>
-        </p:txBody>
-      </p:sp>
-      <p:sp>
-        <p:nvSpPr>
-          <p:cNvPr id="7" name="Content Placeholder 6"/>
-          <p:cNvSpPr>
-            <a:spLocks noGrp="1"/>
-          </p:cNvSpPr>
+            <a:endParaRPr lang="en-US"/>
+          </a:p>
+        </p:txBody>
+      </p:sp>
+      <p:pic>
+        <p:nvPicPr>
+          <p:cNvPr id="4" name="Content Placeholder 3"/>
+          <p:cNvPicPr>
+            <a:picLocks noGrp="1" noChangeAspect="1"/>
+          </p:cNvPicPr>
           <p:nvPr>
             <p:ph idx="1"/>
           </p:nvPr>
-        </p:nvSpPr>
-        <p:spPr/>
-        <p:txBody>
-          <a:bodyPr>
-            <a:normAutofit/>
-          </a:bodyPr>
-          <a:lstStyle/>
-          <a:p>
-            <a:endParaRPr lang="en-US" dirty="0"/>
-          </a:p>
-        </p:txBody>
-      </p:sp>
-      <p:sp>
-        <p:nvSpPr>
-          <p:cNvPr id="4" name="Text Placeholder 3"/>
-          <p:cNvSpPr>
-            <a:spLocks noGrp="1"/>
-          </p:cNvSpPr>
-          <p:nvPr>
-            <p:ph type="body" sz="half" idx="2"/>
-          </p:nvPr>
-        </p:nvSpPr>
-        <p:spPr/>
-        <p:txBody>
-          <a:bodyPr/>
-          <a:lstStyle/>
-          <a:p>
-            <a:endParaRPr lang="en-US" dirty="0"/>
-          </a:p>
-        </p:txBody>
-      </p:sp>
+        </p:nvPicPr>
+        <p:blipFill>
+          <a:blip r:embed="rId4">
+            <a:extLst>
+              <a:ext uri="{28A0092B-C50C-407E-A947-70E740481C1C}">
+                <a14:useLocalDpi xmlns:a14="http://schemas.microsoft.com/office/drawing/2010/main" val="0"/>
+              </a:ext>
+            </a:extLst>
+          </a:blip>
+          <a:stretch>
+            <a:fillRect/>
+          </a:stretch>
+        </p:blipFill>
+        <p:spPr>
+          <a:xfrm>
+            <a:off x="186266" y="1295400"/>
+            <a:ext cx="4114800" cy="4114800"/>
+          </a:xfrm>
+        </p:spPr>
+      </p:pic>
     </p:spTree>
     <p:extLst>
       <p:ext uri="{BB962C8B-B14F-4D97-AF65-F5344CB8AC3E}">
-        <p14:creationId xmlns:p14="http://schemas.microsoft.com/office/powerpoint/2010/main" val="1748889842"/>
+        <p14:creationId xmlns:p14="http://schemas.microsoft.com/office/powerpoint/2010/main" val="1548506332"/>
       </p:ext>
     </p:extLst>
   </p:cSld>
@@ -5617,14 +6298,359 @@
       </p:grpSpPr>
       <p:sp>
         <p:nvSpPr>
-          <p:cNvPr id="2" name="TextBox 1"/>
+          <p:cNvPr id="2" name="Title 1"/>
+          <p:cNvSpPr>
+            <a:spLocks noGrp="1"/>
+          </p:cNvSpPr>
+          <p:nvPr>
+            <p:ph type="title"/>
+          </p:nvPr>
+        </p:nvSpPr>
+        <p:spPr>
+          <a:xfrm>
+            <a:off x="6892332" y="101600"/>
+            <a:ext cx="4953002" cy="1066800"/>
+          </a:xfrm>
+        </p:spPr>
+        <p:txBody>
+          <a:bodyPr/>
+          <a:lstStyle/>
+          <a:p>
+            <a:r>
+              <a:rPr lang="en-US" smtClean="0"/>
+              <a:t>Fractal dimensionality</a:t>
+            </a:r>
+            <a:endParaRPr lang="en-US"/>
+          </a:p>
+        </p:txBody>
+      </p:sp>
+      <p:pic>
+        <p:nvPicPr>
+          <p:cNvPr id="4" name="Content Placeholder 3"/>
+          <p:cNvPicPr>
+            <a:picLocks noGrp="1" noChangeAspect="1"/>
+          </p:cNvPicPr>
+          <p:nvPr>
+            <p:ph idx="1"/>
+          </p:nvPr>
+        </p:nvPicPr>
+        <p:blipFill>
+          <a:blip r:embed="rId2">
+            <a:extLst>
+              <a:ext uri="{28A0092B-C50C-407E-A947-70E740481C1C}">
+                <a14:useLocalDpi xmlns:a14="http://schemas.microsoft.com/office/drawing/2010/main" val="0"/>
+              </a:ext>
+            </a:extLst>
+          </a:blip>
+          <a:stretch>
+            <a:fillRect/>
+          </a:stretch>
+        </p:blipFill>
+        <p:spPr>
+          <a:xfrm>
+            <a:off x="531812" y="635000"/>
+            <a:ext cx="5410200" cy="5410200"/>
+          </a:xfrm>
+        </p:spPr>
+      </p:pic>
+      <mc:AlternateContent xmlns:mc="http://schemas.openxmlformats.org/markup-compatibility/2006">
+        <mc:Choice xmlns:a14="http://schemas.microsoft.com/office/drawing/2010/main" Requires="a14">
+          <p:sp>
+            <p:nvSpPr>
+              <p:cNvPr id="5" name="TextBox 4"/>
+              <p:cNvSpPr txBox="1"/>
+              <p:nvPr/>
+            </p:nvSpPr>
+            <p:spPr>
+              <a:xfrm>
+                <a:off x="7694612" y="1580043"/>
+                <a:ext cx="3043643" cy="478721"/>
+              </a:xfrm>
+              <a:prstGeom prst="rect">
+                <a:avLst/>
+              </a:prstGeom>
+              <a:noFill/>
+            </p:spPr>
+            <p:txBody>
+              <a:bodyPr wrap="square" lIns="0" tIns="0" rIns="0" bIns="0" rtlCol="0">
+                <a:spAutoFit/>
+              </a:bodyPr>
+              <a:lstStyle/>
+              <a:p>
+                <a:pPr>
+                  <a:lnSpc>
+                    <a:spcPct val="90000"/>
+                  </a:lnSpc>
+                </a:pPr>
+                <a14:m>
+                  <m:oMathPara xmlns:m="http://schemas.openxmlformats.org/officeDocument/2006/math">
+                    <m:oMathParaPr>
+                      <m:jc m:val="centerGroup"/>
+                    </m:oMathParaPr>
+                    <m:oMath xmlns:m="http://schemas.openxmlformats.org/officeDocument/2006/math">
+                      <m:func>
+                        <m:funcPr>
+                          <m:ctrlPr>
+                            <a:rPr lang="en-US" sz="3200" b="0" i="1" smtClean="0">
+                              <a:latin typeface="Cambria Math" charset="0"/>
+                            </a:rPr>
+                          </m:ctrlPr>
+                        </m:funcPr>
+                        <m:fName>
+                          <m:r>
+                            <m:rPr>
+                              <m:sty m:val="p"/>
+                            </m:rPr>
+                            <a:rPr lang="en-US" sz="3200" b="0" i="0" smtClean="0">
+                              <a:latin typeface="Cambria Math" charset="0"/>
+                            </a:rPr>
+                            <m:t>log</m:t>
+                          </m:r>
+                        </m:fName>
+                        <m:e>
+                          <m:r>
+                            <a:rPr lang="en-US" sz="3200" b="0" i="1" smtClean="0">
+                              <a:latin typeface="Cambria Math" charset="0"/>
+                            </a:rPr>
+                            <m:t>𝑚</m:t>
+                          </m:r>
+                          <m:r>
+                            <a:rPr lang="en-US" sz="3200" b="0" i="1" smtClean="0">
+                              <a:latin typeface="Cambria Math" charset="0"/>
+                            </a:rPr>
+                            <m:t>=</m:t>
+                          </m:r>
+                          <m:sSub>
+                            <m:sSubPr>
+                              <m:ctrlPr>
+                                <a:rPr lang="en-US" sz="3200" b="0" i="1" smtClean="0">
+                                  <a:latin typeface="Cambria Math" charset="0"/>
+                                </a:rPr>
+                              </m:ctrlPr>
+                            </m:sSubPr>
+                            <m:e>
+                              <m:r>
+                                <a:rPr lang="en-US" sz="3200" b="0" i="1" smtClean="0">
+                                  <a:latin typeface="Cambria Math" charset="0"/>
+                                </a:rPr>
+                                <m:t>𝑑</m:t>
+                              </m:r>
+                            </m:e>
+                            <m:sub>
+                              <m:r>
+                                <a:rPr lang="en-US" sz="3200" b="0" i="1" smtClean="0">
+                                  <a:latin typeface="Cambria Math" charset="0"/>
+                                </a:rPr>
+                                <m:t>𝑓</m:t>
+                              </m:r>
+                            </m:sub>
+                          </m:sSub>
+                          <m:r>
+                            <m:rPr>
+                              <m:sty m:val="p"/>
+                            </m:rPr>
+                            <a:rPr lang="en-US" sz="3200" b="0" i="0" smtClean="0">
+                              <a:latin typeface="Cambria Math" charset="0"/>
+                            </a:rPr>
+                            <m:t>log</m:t>
+                          </m:r>
+                          <m:r>
+                            <a:rPr lang="en-US" sz="3200" b="0" i="1" smtClean="0">
+                              <a:latin typeface="Cambria Math" charset="0"/>
+                            </a:rPr>
+                            <m:t>⁡(</m:t>
+                          </m:r>
+                          <m:r>
+                            <a:rPr lang="en-US" sz="3200" b="0" i="1" smtClean="0">
+                              <a:latin typeface="Cambria Math" charset="0"/>
+                            </a:rPr>
+                            <m:t>𝑟</m:t>
+                          </m:r>
+                          <m:r>
+                            <a:rPr lang="en-US" sz="3200" b="0" i="1" smtClean="0">
+                              <a:latin typeface="Cambria Math" charset="0"/>
+                            </a:rPr>
+                            <m:t>)</m:t>
+                          </m:r>
+                        </m:e>
+                      </m:func>
+                    </m:oMath>
+                  </m:oMathPara>
+                </a14:m>
+                <a:endParaRPr lang="en-US" sz="3200" dirty="0"/>
+              </a:p>
+            </p:txBody>
+          </p:sp>
+        </mc:Choice>
+        <mc:Fallback>
+          <p:sp>
+            <p:nvSpPr>
+              <p:cNvPr id="5" name="TextBox 4"/>
+              <p:cNvSpPr txBox="1">
+                <a:spLocks noRot="1" noChangeAspect="1" noMove="1" noResize="1" noEditPoints="1" noAdjustHandles="1" noChangeArrowheads="1" noChangeShapeType="1" noTextEdit="1"/>
+              </p:cNvSpPr>
+              <p:nvPr/>
+            </p:nvSpPr>
+            <p:spPr>
+              <a:xfrm>
+                <a:off x="7694612" y="1580043"/>
+                <a:ext cx="3043643" cy="478721"/>
+              </a:xfrm>
+              <a:prstGeom prst="rect">
+                <a:avLst/>
+              </a:prstGeom>
+              <a:blipFill rotWithShape="0">
+                <a:blip r:embed="rId3"/>
+                <a:stretch>
+                  <a:fillRect b="-3797"/>
+                </a:stretch>
+              </a:blipFill>
+            </p:spPr>
+            <p:txBody>
+              <a:bodyPr/>
+              <a:lstStyle/>
+              <a:p>
+                <a:r>
+                  <a:rPr lang="en-US">
+                    <a:noFill/>
+                  </a:rPr>
+                  <a:t> </a:t>
+                </a:r>
+              </a:p>
+            </p:txBody>
+          </p:sp>
+        </mc:Fallback>
+      </mc:AlternateContent>
+      <mc:AlternateContent xmlns:mc="http://schemas.openxmlformats.org/markup-compatibility/2006">
+        <mc:Choice xmlns:a14="http://schemas.microsoft.com/office/drawing/2010/main" Requires="a14">
+          <p:sp>
+            <p:nvSpPr>
+              <p:cNvPr id="7" name="TextBox 6"/>
+              <p:cNvSpPr txBox="1"/>
+              <p:nvPr/>
+            </p:nvSpPr>
+            <p:spPr>
+              <a:xfrm>
+                <a:off x="3579812" y="4191000"/>
+                <a:ext cx="1373709" cy="299184"/>
+              </a:xfrm>
+              <a:prstGeom prst="rect">
+                <a:avLst/>
+              </a:prstGeom>
+              <a:noFill/>
+            </p:spPr>
+            <p:txBody>
+              <a:bodyPr wrap="none" lIns="0" tIns="0" rIns="0" bIns="0" rtlCol="0">
+                <a:spAutoFit/>
+              </a:bodyPr>
+              <a:lstStyle/>
+              <a:p>
+                <a:pPr>
+                  <a:lnSpc>
+                    <a:spcPct val="90000"/>
+                  </a:lnSpc>
+                </a:pPr>
+                <a14:m>
+                  <m:oMathPara xmlns:m="http://schemas.openxmlformats.org/officeDocument/2006/math">
+                    <m:oMathParaPr>
+                      <m:jc m:val="centerGroup"/>
+                    </m:oMathParaPr>
+                    <m:oMath xmlns:m="http://schemas.openxmlformats.org/officeDocument/2006/math">
+                      <m:sSub>
+                        <m:sSubPr>
+                          <m:ctrlPr>
+                            <a:rPr lang="en-US" sz="2000" b="0" i="1" smtClean="0">
+                              <a:latin typeface="Cambria Math" charset="0"/>
+                            </a:rPr>
+                          </m:ctrlPr>
+                        </m:sSubPr>
+                        <m:e>
+                          <m:r>
+                            <a:rPr lang="en-US" sz="2000" b="0" i="1" smtClean="0">
+                              <a:latin typeface="Cambria Math" charset="0"/>
+                            </a:rPr>
+                            <m:t>𝑑</m:t>
+                          </m:r>
+                        </m:e>
+                        <m:sub>
+                          <m:r>
+                            <a:rPr lang="en-US" sz="2000" b="0" i="1" smtClean="0">
+                              <a:latin typeface="Cambria Math" charset="0"/>
+                            </a:rPr>
+                            <m:t>𝑓</m:t>
+                          </m:r>
+                        </m:sub>
+                      </m:sSub>
+                      <m:r>
+                        <a:rPr lang="en-US" sz="2000" b="0" i="1" smtClean="0">
+                          <a:latin typeface="Cambria Math" charset="0"/>
+                        </a:rPr>
+                        <m:t>=</m:t>
+                      </m:r>
+                      <m:r>
+                        <m:rPr>
+                          <m:nor/>
+                        </m:rPr>
+                        <a:rPr lang="en-US" sz="2000"/>
+                        <m:t>1.712</m:t>
+                      </m:r>
+                    </m:oMath>
+                  </m:oMathPara>
+                </a14:m>
+                <a:endParaRPr lang="en-US" sz="2400" dirty="0"/>
+              </a:p>
+            </p:txBody>
+          </p:sp>
+        </mc:Choice>
+        <mc:Fallback>
+          <p:sp>
+            <p:nvSpPr>
+              <p:cNvPr id="7" name="TextBox 6"/>
+              <p:cNvSpPr txBox="1">
+                <a:spLocks noRot="1" noChangeAspect="1" noMove="1" noResize="1" noEditPoints="1" noAdjustHandles="1" noChangeArrowheads="1" noChangeShapeType="1" noTextEdit="1"/>
+              </p:cNvSpPr>
+              <p:nvPr/>
+            </p:nvSpPr>
+            <p:spPr>
+              <a:xfrm>
+                <a:off x="3579812" y="4191000"/>
+                <a:ext cx="1373709" cy="299184"/>
+              </a:xfrm>
+              <a:prstGeom prst="rect">
+                <a:avLst/>
+              </a:prstGeom>
+              <a:blipFill rotWithShape="0">
+                <a:blip r:embed="rId4"/>
+                <a:stretch>
+                  <a:fillRect l="-1770" t="-12245" r="-2212" b="-30612"/>
+                </a:stretch>
+              </a:blipFill>
+            </p:spPr>
+            <p:txBody>
+              <a:bodyPr/>
+              <a:lstStyle/>
+              <a:p>
+                <a:r>
+                  <a:rPr lang="en-US">
+                    <a:noFill/>
+                  </a:rPr>
+                  <a:t> </a:t>
+                </a:r>
+              </a:p>
+            </p:txBody>
+          </p:sp>
+        </mc:Fallback>
+      </mc:AlternateContent>
+      <p:sp>
+        <p:nvSpPr>
+          <p:cNvPr id="8" name="TextBox 7"/>
           <p:cNvSpPr txBox="1"/>
           <p:nvPr/>
         </p:nvSpPr>
         <p:spPr>
           <a:xfrm>
-            <a:off x="2817812" y="2819400"/>
-            <a:ext cx="5562600" cy="757130"/>
+            <a:off x="7044733" y="2496878"/>
+            <a:ext cx="4343400" cy="757130"/>
           </a:xfrm>
           <a:prstGeom prst="rect">
             <a:avLst/>
@@ -5643,8 +6669,187 @@
               </a:lnSpc>
             </a:pPr>
             <a:r>
+              <a:rPr lang="en-US" sz="2400" dirty="0" smtClean="0"/>
+              <a:t>In 10 runs </a:t>
+            </a:r>
+            <a:r>
+              <a:rPr lang="en-US" sz="2400" smtClean="0"/>
+              <a:t>fractal dimensionality:</a:t>
+            </a:r>
+            <a:endParaRPr lang="en-US" sz="2400"/>
+          </a:p>
+        </p:txBody>
+      </p:sp>
+      <p:sp>
+        <p:nvSpPr>
+          <p:cNvPr id="9" name="TextBox 8"/>
+          <p:cNvSpPr txBox="1"/>
+          <p:nvPr/>
+        </p:nvSpPr>
+        <p:spPr>
+          <a:xfrm>
+            <a:off x="6683872" y="3583462"/>
+            <a:ext cx="5369921" cy="757130"/>
+          </a:xfrm>
+          <a:prstGeom prst="rect">
+            <a:avLst/>
+          </a:prstGeom>
+          <a:noFill/>
+        </p:spPr>
+        <p:txBody>
+          <a:bodyPr wrap="square" rtlCol="0">
+            <a:spAutoFit/>
+          </a:bodyPr>
+          <a:lstStyle/>
+          <a:p>
+            <a:pPr>
+              <a:lnSpc>
+                <a:spcPct val="90000"/>
+              </a:lnSpc>
+            </a:pPr>
+            <a:r>
+              <a:rPr lang="en-US" sz="2400" b="1"/>
+              <a:t>2.067, 1.653, 1.877, 1.833, 1.607, 1.832,1.782, 1.712, 1.843, 1.862</a:t>
+            </a:r>
+            <a:endParaRPr lang="en-US" sz="2400" b="1" dirty="0"/>
+          </a:p>
+        </p:txBody>
+      </p:sp>
+      <p:sp>
+        <p:nvSpPr>
+          <p:cNvPr id="10" name="TextBox 9"/>
+          <p:cNvSpPr txBox="1"/>
+          <p:nvPr/>
+        </p:nvSpPr>
+        <p:spPr>
+          <a:xfrm>
+            <a:off x="8054383" y="4876800"/>
+            <a:ext cx="2324099" cy="480131"/>
+          </a:xfrm>
+          <a:prstGeom prst="rect">
+            <a:avLst/>
+          </a:prstGeom>
+          <a:noFill/>
+        </p:spPr>
+        <p:txBody>
+          <a:bodyPr wrap="square" rtlCol="0">
+            <a:spAutoFit/>
+          </a:bodyPr>
+          <a:lstStyle/>
+          <a:p>
+            <a:pPr>
+              <a:lnSpc>
+                <a:spcPct val="90000"/>
+              </a:lnSpc>
+            </a:pPr>
+            <a:r>
+              <a:rPr lang="en-US" sz="2800" b="1" i="1" dirty="0" smtClean="0">
+                <a:solidFill>
+                  <a:srgbClr val="FF0000"/>
+                </a:solidFill>
+              </a:rPr>
+              <a:t>m</a:t>
+            </a:r>
+            <a:r>
+              <a:rPr lang="en-US" sz="2800" b="1" i="1" dirty="0" smtClean="0">
+                <a:solidFill>
+                  <a:srgbClr val="FF0000"/>
+                </a:solidFill>
+              </a:rPr>
+              <a:t>ean=</a:t>
+            </a:r>
+            <a:r>
+              <a:rPr lang="en-US" sz="2800" b="1" i="1" dirty="0" smtClean="0">
+                <a:solidFill>
+                  <a:srgbClr val="FF0000"/>
+                </a:solidFill>
+              </a:rPr>
+              <a:t>1.807</a:t>
+            </a:r>
+            <a:endParaRPr lang="en-US" sz="2800" b="1" i="1" dirty="0">
+              <a:solidFill>
+                <a:srgbClr val="FF0000"/>
+              </a:solidFill>
+            </a:endParaRPr>
+          </a:p>
+        </p:txBody>
+      </p:sp>
+    </p:spTree>
+    <p:extLst>
+      <p:ext uri="{BB962C8B-B14F-4D97-AF65-F5344CB8AC3E}">
+        <p14:creationId xmlns:p14="http://schemas.microsoft.com/office/powerpoint/2010/main" val="716936238"/>
+      </p:ext>
+    </p:extLst>
+  </p:cSld>
+  <p:clrMapOvr>
+    <a:masterClrMapping/>
+  </p:clrMapOvr>
+  <mc:AlternateContent xmlns:mc="http://schemas.openxmlformats.org/markup-compatibility/2006" xmlns:p14="http://schemas.microsoft.com/office/powerpoint/2010/main">
+    <mc:Choice Requires="p14">
+      <p:transition spd="med" p14:dur="700">
+        <p:fade/>
+      </p:transition>
+    </mc:Choice>
+    <mc:Fallback xmlns="">
+      <p:transition spd="med">
+        <p:fade/>
+      </p:transition>
+    </mc:Fallback>
+  </mc:AlternateContent>
+</p:sld>
+</file>
+
+<file path=ppt/slides/slide15.xml><?xml version="1.0" encoding="utf-8"?>
+<p:sld xmlns:a="http://schemas.openxmlformats.org/drawingml/2006/main" xmlns:r="http://schemas.openxmlformats.org/officeDocument/2006/relationships" xmlns:p="http://schemas.openxmlformats.org/presentationml/2006/main">
+  <p:cSld>
+    <p:spTree>
+      <p:nvGrpSpPr>
+        <p:cNvPr id="1" name=""/>
+        <p:cNvGrpSpPr/>
+        <p:nvPr/>
+      </p:nvGrpSpPr>
+      <p:grpSpPr>
+        <a:xfrm>
+          <a:off x="0" y="0"/>
+          <a:ext cx="0" cy="0"/>
+          <a:chOff x="0" y="0"/>
+          <a:chExt cx="0" cy="0"/>
+        </a:xfrm>
+      </p:grpSpPr>
+      <p:sp>
+        <p:nvSpPr>
+          <p:cNvPr id="2" name="TextBox 1"/>
+          <p:cNvSpPr txBox="1"/>
+          <p:nvPr/>
+        </p:nvSpPr>
+        <p:spPr>
+          <a:xfrm>
+            <a:off x="2817812" y="2819400"/>
+            <a:ext cx="5562600" cy="1421928"/>
+          </a:xfrm>
+          <a:prstGeom prst="rect">
+            <a:avLst/>
+          </a:prstGeom>
+          <a:noFill/>
+        </p:spPr>
+        <p:txBody>
+          <a:bodyPr wrap="square" rtlCol="0">
+            <a:spAutoFit/>
+          </a:bodyPr>
+          <a:lstStyle/>
+          <a:p>
+            <a:pPr>
+              <a:lnSpc>
+                <a:spcPct val="90000"/>
+              </a:lnSpc>
+            </a:pPr>
+            <a:r>
+              <a:rPr lang="en-US" sz="4800" dirty="0" smtClean="0"/>
+              <a:t>Thank you </a:t>
+            </a:r>
+            <a:r>
               <a:rPr lang="en-US" sz="4800" dirty="0"/>
-              <a:t>Thanks for your time!</a:t>
+              <a:t>for your time!</a:t>
             </a:r>
           </a:p>
         </p:txBody>

</xml_diff>

<commit_message>
removed text box from slide
</commit_message>
<xml_diff>
--- a/Presentation.pptx
+++ b/Presentation.pptx
@@ -5,10 +5,10 @@
     <p:sldMasterId id="2147483912" r:id="rId2"/>
   </p:sldMasterIdLst>
   <p:notesMasterIdLst>
-    <p:notesMasterId r:id="rId17"/>
+    <p:notesMasterId r:id="rId18"/>
   </p:notesMasterIdLst>
   <p:handoutMasterIdLst>
-    <p:handoutMasterId r:id="rId18"/>
+    <p:handoutMasterId r:id="rId19"/>
   </p:handoutMasterIdLst>
   <p:sldIdLst>
     <p:sldId id="256" r:id="rId3"/>
@@ -23,8 +23,9 @@
     <p:sldId id="284" r:id="rId12"/>
     <p:sldId id="275" r:id="rId13"/>
     <p:sldId id="279" r:id="rId14"/>
-    <p:sldId id="278" r:id="rId15"/>
-    <p:sldId id="280" r:id="rId16"/>
+    <p:sldId id="285" r:id="rId15"/>
+    <p:sldId id="286" r:id="rId16"/>
+    <p:sldId id="280" r:id="rId17"/>
   </p:sldIdLst>
   <p:sldSz cx="12188825" cy="6858000"/>
   <p:notesSz cx="6858000" cy="9144000"/>
@@ -238,7 +239,7 @@
           <a:p>
             <a:fld id="{BEA74EB7-856E-45FD-83F0-5F7C6F3E4372}" type="datetimeFigureOut">
               <a:rPr lang="en-US"/>
-              <a:t>3/22/2017</a:t>
+              <a:t>3/23/2017</a:t>
             </a:fld>
             <a:endParaRPr/>
           </a:p>
@@ -403,7 +404,7 @@
           <a:p>
             <a:fld id="{C61B0E40-8125-41F8-BB6C-139D8D531A4F}" type="datetimeFigureOut">
               <a:rPr lang="en-US"/>
-              <a:t>3/22/2017</a:t>
+              <a:t>3/23/2017</a:t>
             </a:fld>
             <a:endParaRPr/>
           </a:p>
@@ -1309,7 +1310,7 @@
             <a:fld id="{8E36636D-D922-432D-A958-524484B5923D}" type="datetimeFigureOut">
               <a:rPr lang="en-US"/>
               <a:pPr/>
-              <a:t>3/22/2017</a:t>
+              <a:t>3/23/2017</a:t>
             </a:fld>
             <a:endParaRPr/>
           </a:p>
@@ -1509,7 +1510,7 @@
             <a:fld id="{8E36636D-D922-432D-A958-524484B5923D}" type="datetimeFigureOut">
               <a:rPr lang="en-US"/>
               <a:pPr/>
-              <a:t>3/22/2017</a:t>
+              <a:t>3/23/2017</a:t>
             </a:fld>
             <a:endParaRPr/>
           </a:p>
@@ -1719,7 +1720,7 @@
             <a:fld id="{8E36636D-D922-432D-A958-524484B5923D}" type="datetimeFigureOut">
               <a:rPr lang="en-US"/>
               <a:pPr/>
-              <a:t>3/22/2017</a:t>
+              <a:t>3/23/2017</a:t>
             </a:fld>
             <a:endParaRPr/>
           </a:p>
@@ -1909,7 +1910,7 @@
             <a:fld id="{8E36636D-D922-432D-A958-524484B5923D}" type="datetimeFigureOut">
               <a:rPr lang="en-US"/>
               <a:pPr/>
-              <a:t>3/22/2017</a:t>
+              <a:t>3/23/2017</a:t>
             </a:fld>
             <a:endParaRPr/>
           </a:p>
@@ -2182,7 +2183,7 @@
             <a:fld id="{8E36636D-D922-432D-A958-524484B5923D}" type="datetimeFigureOut">
               <a:rPr lang="en-US"/>
               <a:pPr/>
-              <a:t>3/22/2017</a:t>
+              <a:t>3/23/2017</a:t>
             </a:fld>
             <a:endParaRPr/>
           </a:p>
@@ -2504,7 +2505,7 @@
             <a:fld id="{8E36636D-D922-432D-A958-524484B5923D}" type="datetimeFigureOut">
               <a:rPr lang="en-US"/>
               <a:pPr/>
-              <a:t>3/22/2017</a:t>
+              <a:t>3/23/2017</a:t>
             </a:fld>
             <a:endParaRPr/>
           </a:p>
@@ -2954,7 +2955,7 @@
             <a:fld id="{8E36636D-D922-432D-A958-524484B5923D}" type="datetimeFigureOut">
               <a:rPr lang="en-US"/>
               <a:pPr/>
-              <a:t>3/22/2017</a:t>
+              <a:t>3/23/2017</a:t>
             </a:fld>
             <a:endParaRPr/>
           </a:p>
@@ -3086,7 +3087,7 @@
             <a:fld id="{8E36636D-D922-432D-A958-524484B5923D}" type="datetimeFigureOut">
               <a:rPr lang="en-US"/>
               <a:pPr/>
-              <a:t>3/22/2017</a:t>
+              <a:t>3/23/2017</a:t>
             </a:fld>
             <a:endParaRPr/>
           </a:p>
@@ -3348,7 +3349,7 @@
             <a:fld id="{8E36636D-D922-432D-A958-524484B5923D}" type="datetimeFigureOut">
               <a:rPr lang="en-US"/>
               <a:pPr/>
-              <a:t>3/22/2017</a:t>
+              <a:t>3/23/2017</a:t>
             </a:fld>
             <a:endParaRPr/>
           </a:p>
@@ -3695,7 +3696,7 @@
             <a:fld id="{8E36636D-D922-432D-A958-524484B5923D}" type="datetimeFigureOut">
               <a:rPr lang="en-US"/>
               <a:pPr/>
-              <a:t>3/22/2017</a:t>
+              <a:t>3/23/2017</a:t>
             </a:fld>
             <a:endParaRPr/>
           </a:p>
@@ -4030,7 +4031,7 @@
             <a:fld id="{8E36636D-D922-432D-A958-524484B5923D}" type="datetimeFigureOut">
               <a:rPr lang="en-US"/>
               <a:pPr/>
-              <a:t>3/22/2017</a:t>
+              <a:t>3/23/2017</a:t>
             </a:fld>
             <a:endParaRPr/>
           </a:p>
@@ -4561,7 +4562,7 @@
             <a:fld id="{8E36636D-D922-432D-A958-524484B5923D}" type="datetimeFigureOut">
               <a:rPr lang="en-US"/>
               <a:pPr/>
-              <a:t>3/22/2017</a:t>
+              <a:t>3/23/2017</a:t>
             </a:fld>
             <a:endParaRPr/>
           </a:p>
@@ -5156,7 +5157,7 @@
         <p:spPr/>
         <p:txBody>
           <a:bodyPr>
-            <a:normAutofit lnSpcReduction="10000"/>
+            <a:normAutofit fontScale="92500" lnSpcReduction="10000"/>
           </a:bodyPr>
           <a:lstStyle/>
           <a:p>
@@ -5438,37 +5439,669 @@
             <p:ph type="title"/>
           </p:nvPr>
         </p:nvSpPr>
-        <p:spPr/>
+        <p:spPr>
+          <a:xfrm>
+            <a:off x="1065212" y="609600"/>
+            <a:ext cx="9143538" cy="1066800"/>
+          </a:xfrm>
+        </p:spPr>
         <p:txBody>
           <a:bodyPr/>
           <a:lstStyle/>
           <a:p>
             <a:r>
               <a:rPr lang="en-US" dirty="0"/>
-              <a:t>ADD STUFF HERE</a:t>
-            </a:r>
-          </a:p>
-        </p:txBody>
-      </p:sp>
-      <p:sp>
-        <p:nvSpPr>
-          <p:cNvPr id="4" name="Content Placeholder 3"/>
-          <p:cNvSpPr>
-            <a:spLocks noGrp="1"/>
-          </p:cNvSpPr>
+              <a:t>DLA Cluster</a:t>
+            </a:r>
+          </a:p>
+        </p:txBody>
+      </p:sp>
+      <p:pic>
+        <p:nvPicPr>
+          <p:cNvPr id="2" name="Content Placeholder 1"/>
+          <p:cNvPicPr>
+            <a:picLocks noGrp="1" noChangeAspect="1"/>
+          </p:cNvPicPr>
           <p:nvPr>
             <p:ph idx="1"/>
           </p:nvPr>
-        </p:nvSpPr>
-        <p:spPr/>
-        <p:txBody>
-          <a:bodyPr/>
+        </p:nvPicPr>
+        <p:blipFill>
+          <a:blip r:embed="rId2">
+            <a:extLst>
+              <a:ext uri="{28A0092B-C50C-407E-A947-70E740481C1C}">
+                <a14:useLocalDpi xmlns:a14="http://schemas.microsoft.com/office/drawing/2010/main" val="0"/>
+              </a:ext>
+            </a:extLst>
+          </a:blip>
+          <a:stretch>
+            <a:fillRect/>
+          </a:stretch>
+        </p:blipFill>
+        <p:spPr>
+          <a:xfrm>
+            <a:off x="5865812" y="381000"/>
+            <a:ext cx="5867399" cy="5867399"/>
+          </a:xfrm>
+        </p:spPr>
+      </p:pic>
+      <p:sp>
+        <p:nvSpPr>
+          <p:cNvPr id="3" name="TextBox 2"/>
+          <p:cNvSpPr txBox="1"/>
+          <p:nvPr/>
+        </p:nvSpPr>
+        <p:spPr>
+          <a:xfrm>
+            <a:off x="1065212" y="1905000"/>
+            <a:ext cx="4571769" cy="757130"/>
+          </a:xfrm>
+          <a:prstGeom prst="rect">
+            <a:avLst/>
+          </a:prstGeom>
+          <a:noFill/>
+        </p:spPr>
+        <p:txBody>
+          <a:bodyPr wrap="square" rtlCol="0">
+            <a:spAutoFit/>
+          </a:bodyPr>
           <a:lstStyle/>
           <a:p>
-            <a:endParaRPr lang="en-US"/>
-          </a:p>
-        </p:txBody>
-      </p:sp>
+            <a:pPr>
+              <a:lnSpc>
+                <a:spcPct val="90000"/>
+              </a:lnSpc>
+            </a:pPr>
+            <a:r>
+              <a:rPr lang="en-US" sz="2400" dirty="0"/>
+              <a:t>Many large open spaces, irregular perimeter</a:t>
+            </a:r>
+          </a:p>
+        </p:txBody>
+      </p:sp>
+      <mc:AlternateContent xmlns:mc="http://schemas.openxmlformats.org/markup-compatibility/2006" xmlns:a14="http://schemas.microsoft.com/office/drawing/2010/main">
+        <mc:Choice Requires="a14">
+          <p:sp>
+            <p:nvSpPr>
+              <p:cNvPr id="7" name="TextBox 6"/>
+              <p:cNvSpPr txBox="1"/>
+              <p:nvPr/>
+            </p:nvSpPr>
+            <p:spPr>
+              <a:xfrm>
+                <a:off x="2149088" y="2945176"/>
+                <a:ext cx="1936299" cy="463268"/>
+              </a:xfrm>
+              <a:prstGeom prst="rect">
+                <a:avLst/>
+              </a:prstGeom>
+              <a:noFill/>
+            </p:spPr>
+            <p:txBody>
+              <a:bodyPr wrap="none" lIns="0" tIns="0" rIns="0" bIns="0" rtlCol="0">
+                <a:spAutoFit/>
+              </a:bodyPr>
+              <a:lstStyle/>
+              <a:p>
+                <a:pPr>
+                  <a:lnSpc>
+                    <a:spcPct val="90000"/>
+                  </a:lnSpc>
+                </a:pPr>
+                <a14:m>
+                  <m:oMathPara xmlns:m="http://schemas.openxmlformats.org/officeDocument/2006/math">
+                    <m:oMathParaPr>
+                      <m:jc m:val="centerGroup"/>
+                    </m:oMathParaPr>
+                    <m:oMath xmlns:m="http://schemas.openxmlformats.org/officeDocument/2006/math">
+                      <m:r>
+                        <m:rPr>
+                          <m:nor/>
+                        </m:rPr>
+                        <a:rPr lang="en-US" sz="3200" dirty="0" smtClean="0"/>
+                        <m:t>m</m:t>
+                      </m:r>
+                      <m:r>
+                        <m:rPr>
+                          <m:nor/>
+                        </m:rPr>
+                        <a:rPr lang="en-US" sz="3200" dirty="0" smtClean="0"/>
+                        <m:t>(</m:t>
+                      </m:r>
+                      <m:r>
+                        <m:rPr>
+                          <m:nor/>
+                        </m:rPr>
+                        <a:rPr lang="en-US" sz="3200" dirty="0" smtClean="0"/>
+                        <m:t>r</m:t>
+                      </m:r>
+                      <m:r>
+                        <m:rPr>
+                          <m:nor/>
+                        </m:rPr>
+                        <a:rPr lang="en-US" sz="3200" dirty="0" smtClean="0"/>
+                        <m:t>)</m:t>
+                      </m:r>
+                      <m:r>
+                        <a:rPr lang="en-US" sz="3200" b="0" i="1" dirty="0" smtClean="0">
+                          <a:latin typeface="Cambria Math" charset="0"/>
+                        </a:rPr>
+                        <m:t>~</m:t>
+                      </m:r>
+                      <m:sSup>
+                        <m:sSupPr>
+                          <m:ctrlPr>
+                            <a:rPr lang="en-US" sz="3200" b="0" i="1" dirty="0" smtClean="0">
+                              <a:latin typeface="Cambria Math" panose="02040503050406030204" pitchFamily="18" charset="0"/>
+                              <a:ea typeface="Cambria Math" charset="0"/>
+                              <a:cs typeface="Cambria Math" charset="0"/>
+                            </a:rPr>
+                          </m:ctrlPr>
+                        </m:sSupPr>
+                        <m:e>
+                          <m:r>
+                            <a:rPr lang="en-US" sz="3200" b="0" i="1" dirty="0" smtClean="0">
+                              <a:latin typeface="Cambria Math" charset="0"/>
+                              <a:ea typeface="Cambria Math" charset="0"/>
+                              <a:cs typeface="Cambria Math" charset="0"/>
+                            </a:rPr>
+                            <m:t>𝑟</m:t>
+                          </m:r>
+                        </m:e>
+                        <m:sup>
+                          <m:sSub>
+                            <m:sSubPr>
+                              <m:ctrlPr>
+                                <a:rPr lang="en-US" sz="3200" b="0" i="1" dirty="0" smtClean="0">
+                                  <a:latin typeface="Cambria Math" panose="02040503050406030204" pitchFamily="18" charset="0"/>
+                                  <a:ea typeface="Cambria Math" charset="0"/>
+                                  <a:cs typeface="Cambria Math" charset="0"/>
+                                </a:rPr>
+                              </m:ctrlPr>
+                            </m:sSubPr>
+                            <m:e>
+                              <m:r>
+                                <a:rPr lang="en-US" sz="3200" b="0" i="1" dirty="0" smtClean="0">
+                                  <a:latin typeface="Cambria Math" charset="0"/>
+                                  <a:ea typeface="Cambria Math" charset="0"/>
+                                  <a:cs typeface="Cambria Math" charset="0"/>
+                                </a:rPr>
+                                <m:t>𝑑</m:t>
+                              </m:r>
+                            </m:e>
+                            <m:sub>
+                              <m:r>
+                                <a:rPr lang="en-US" sz="3200" b="0" i="1" dirty="0" smtClean="0">
+                                  <a:latin typeface="Cambria Math" charset="0"/>
+                                  <a:ea typeface="Cambria Math" charset="0"/>
+                                  <a:cs typeface="Cambria Math" charset="0"/>
+                                </a:rPr>
+                                <m:t>𝑓</m:t>
+                              </m:r>
+                            </m:sub>
+                          </m:sSub>
+                        </m:sup>
+                      </m:sSup>
+                      <m:r>
+                        <a:rPr lang="en-US" sz="3200" b="0" i="1" dirty="0" smtClean="0">
+                          <a:latin typeface="Cambria Math" charset="0"/>
+                          <a:ea typeface="Cambria Math" charset="0"/>
+                          <a:cs typeface="Cambria Math" charset="0"/>
+                        </a:rPr>
+                        <m:t> </m:t>
+                      </m:r>
+                    </m:oMath>
+                  </m:oMathPara>
+                </a14:m>
+                <a:endParaRPr lang="en-US" sz="3200" dirty="0"/>
+              </a:p>
+            </p:txBody>
+          </p:sp>
+        </mc:Choice>
+        <mc:Fallback xmlns="">
+          <p:sp>
+            <p:nvSpPr>
+              <p:cNvPr id="7" name="TextBox 6"/>
+              <p:cNvSpPr txBox="1">
+                <a:spLocks noRot="1" noChangeAspect="1" noMove="1" noResize="1" noEditPoints="1" noAdjustHandles="1" noChangeArrowheads="1" noChangeShapeType="1" noTextEdit="1"/>
+              </p:cNvSpPr>
+              <p:nvPr/>
+            </p:nvSpPr>
+            <p:spPr>
+              <a:xfrm>
+                <a:off x="2149088" y="2945176"/>
+                <a:ext cx="1936299" cy="463268"/>
+              </a:xfrm>
+              <a:prstGeom prst="rect">
+                <a:avLst/>
+              </a:prstGeom>
+              <a:blipFill rotWithShape="0">
+                <a:blip r:embed="rId3"/>
+                <a:stretch>
+                  <a:fillRect/>
+                </a:stretch>
+              </a:blipFill>
+            </p:spPr>
+            <p:txBody>
+              <a:bodyPr/>
+              <a:lstStyle/>
+              <a:p>
+                <a:r>
+                  <a:rPr lang="en-US">
+                    <a:noFill/>
+                  </a:rPr>
+                  <a:t> </a:t>
+                </a:r>
+              </a:p>
+            </p:txBody>
+          </p:sp>
+        </mc:Fallback>
+      </mc:AlternateContent>
+      <mc:AlternateContent xmlns:mc="http://schemas.openxmlformats.org/markup-compatibility/2006" xmlns:a14="http://schemas.microsoft.com/office/drawing/2010/main">
+        <mc:Choice Requires="a14">
+          <p:sp>
+            <p:nvSpPr>
+              <p:cNvPr id="8" name="TextBox 7"/>
+              <p:cNvSpPr txBox="1"/>
+              <p:nvPr/>
+            </p:nvSpPr>
+            <p:spPr>
+              <a:xfrm>
+                <a:off x="1080557" y="3764143"/>
+                <a:ext cx="4073359" cy="359073"/>
+              </a:xfrm>
+              <a:prstGeom prst="rect">
+                <a:avLst/>
+              </a:prstGeom>
+              <a:noFill/>
+            </p:spPr>
+            <p:txBody>
+              <a:bodyPr wrap="none" lIns="0" tIns="0" rIns="0" bIns="0" rtlCol="0">
+                <a:spAutoFit/>
+              </a:bodyPr>
+              <a:lstStyle/>
+              <a:p>
+                <a:pPr>
+                  <a:lnSpc>
+                    <a:spcPct val="90000"/>
+                  </a:lnSpc>
+                </a:pPr>
+                <a14:m>
+                  <m:oMathPara xmlns:m="http://schemas.openxmlformats.org/officeDocument/2006/math">
+                    <m:oMathParaPr>
+                      <m:jc m:val="centerGroup"/>
+                    </m:oMathParaPr>
+                    <m:oMath xmlns:m="http://schemas.openxmlformats.org/officeDocument/2006/math">
+                      <m:sSub>
+                        <m:sSubPr>
+                          <m:ctrlPr>
+                            <a:rPr lang="en-US" sz="2400" b="0" i="1" smtClean="0">
+                              <a:latin typeface="Cambria Math" panose="02040503050406030204" pitchFamily="18" charset="0"/>
+                            </a:rPr>
+                          </m:ctrlPr>
+                        </m:sSubPr>
+                        <m:e>
+                          <m:r>
+                            <a:rPr lang="en-US" sz="2400" b="0" i="1" smtClean="0">
+                              <a:latin typeface="Cambria Math" charset="0"/>
+                            </a:rPr>
+                            <m:t>𝑑</m:t>
+                          </m:r>
+                        </m:e>
+                        <m:sub>
+                          <m:r>
+                            <a:rPr lang="en-US" sz="2400" b="0" i="1" smtClean="0">
+                              <a:latin typeface="Cambria Math" charset="0"/>
+                            </a:rPr>
+                            <m:t>𝑓</m:t>
+                          </m:r>
+                        </m:sub>
+                      </m:sSub>
+                      <m:r>
+                        <a:rPr lang="en-US" sz="2400" b="0" i="1" smtClean="0">
+                          <a:latin typeface="Cambria Math" charset="0"/>
+                        </a:rPr>
+                        <m:t>=</m:t>
+                      </m:r>
+                      <m:r>
+                        <a:rPr lang="en-US" sz="2400" b="0" i="1" smtClean="0">
+                          <a:latin typeface="Cambria Math" charset="0"/>
+                        </a:rPr>
+                        <m:t>𝑓𝑟𝑎𝑐𝑡𝑎𝑙</m:t>
+                      </m:r>
+                      <m:r>
+                        <a:rPr lang="en-US" sz="2400" b="0" i="1" smtClean="0">
+                          <a:latin typeface="Cambria Math" charset="0"/>
+                        </a:rPr>
+                        <m:t> </m:t>
+                      </m:r>
+                      <m:r>
+                        <a:rPr lang="en-US" sz="2400" b="0" i="1" smtClean="0">
+                          <a:latin typeface="Cambria Math" charset="0"/>
+                        </a:rPr>
+                        <m:t>𝑑𝑖𝑚𝑒𝑛𝑠𝑖𝑜𝑛𝑎𝑙𝑖𝑡𝑦</m:t>
+                      </m:r>
+                    </m:oMath>
+                  </m:oMathPara>
+                </a14:m>
+                <a:endParaRPr lang="en-US" sz="2400" dirty="0"/>
+              </a:p>
+            </p:txBody>
+          </p:sp>
+        </mc:Choice>
+        <mc:Fallback xmlns="">
+          <p:sp>
+            <p:nvSpPr>
+              <p:cNvPr id="8" name="TextBox 7"/>
+              <p:cNvSpPr txBox="1">
+                <a:spLocks noRot="1" noChangeAspect="1" noMove="1" noResize="1" noEditPoints="1" noAdjustHandles="1" noChangeArrowheads="1" noChangeShapeType="1" noTextEdit="1"/>
+              </p:cNvSpPr>
+              <p:nvPr/>
+            </p:nvSpPr>
+            <p:spPr>
+              <a:xfrm>
+                <a:off x="1080557" y="3764143"/>
+                <a:ext cx="4073359" cy="359073"/>
+              </a:xfrm>
+              <a:prstGeom prst="rect">
+                <a:avLst/>
+              </a:prstGeom>
+              <a:blipFill rotWithShape="0">
+                <a:blip r:embed="rId4"/>
+                <a:stretch>
+                  <a:fillRect l="-299" t="-152542" r="-1048" b="-177966"/>
+                </a:stretch>
+              </a:blipFill>
+            </p:spPr>
+            <p:txBody>
+              <a:bodyPr/>
+              <a:lstStyle/>
+              <a:p>
+                <a:r>
+                  <a:rPr lang="en-US">
+                    <a:noFill/>
+                  </a:rPr>
+                  <a:t> </a:t>
+                </a:r>
+              </a:p>
+            </p:txBody>
+          </p:sp>
+        </mc:Fallback>
+      </mc:AlternateContent>
+      <mc:AlternateContent xmlns:mc="http://schemas.openxmlformats.org/markup-compatibility/2006" xmlns:a14="http://schemas.microsoft.com/office/drawing/2010/main">
+        <mc:Choice Requires="a14">
+          <p:sp>
+            <p:nvSpPr>
+              <p:cNvPr id="9" name="TextBox 8"/>
+              <p:cNvSpPr txBox="1"/>
+              <p:nvPr/>
+            </p:nvSpPr>
+            <p:spPr>
+              <a:xfrm>
+                <a:off x="1827212" y="4485105"/>
+                <a:ext cx="2441694" cy="299184"/>
+              </a:xfrm>
+              <a:prstGeom prst="rect">
+                <a:avLst/>
+              </a:prstGeom>
+              <a:noFill/>
+            </p:spPr>
+            <p:txBody>
+              <a:bodyPr wrap="none" lIns="0" tIns="0" rIns="0" bIns="0" rtlCol="0">
+                <a:spAutoFit/>
+              </a:bodyPr>
+              <a:lstStyle/>
+              <a:p>
+                <a:pPr>
+                  <a:lnSpc>
+                    <a:spcPct val="90000"/>
+                  </a:lnSpc>
+                </a:pPr>
+                <a14:m>
+                  <m:oMathPara xmlns:m="http://schemas.openxmlformats.org/officeDocument/2006/math">
+                    <m:oMathParaPr>
+                      <m:jc m:val="centerGroup"/>
+                    </m:oMathParaPr>
+                    <m:oMath xmlns:m="http://schemas.openxmlformats.org/officeDocument/2006/math">
+                      <m:sSub>
+                        <m:sSubPr>
+                          <m:ctrlPr>
+                            <a:rPr lang="en-US" sz="2000" b="0" i="1" smtClean="0">
+                              <a:latin typeface="Cambria Math" panose="02040503050406030204" pitchFamily="18" charset="0"/>
+                            </a:rPr>
+                          </m:ctrlPr>
+                        </m:sSubPr>
+                        <m:e>
+                          <m:r>
+                            <a:rPr lang="en-US" sz="2000" b="0" i="1" smtClean="0">
+                              <a:latin typeface="Cambria Math" charset="0"/>
+                            </a:rPr>
+                            <m:t>𝑑</m:t>
+                          </m:r>
+                        </m:e>
+                        <m:sub>
+                          <m:r>
+                            <a:rPr lang="en-US" sz="2000" b="0" i="1" smtClean="0">
+                              <a:latin typeface="Cambria Math" charset="0"/>
+                            </a:rPr>
+                            <m:t>𝑓</m:t>
+                          </m:r>
+                        </m:sub>
+                      </m:sSub>
+                      <m:r>
+                        <a:rPr lang="en-US" sz="2000" b="0" i="1" smtClean="0">
+                          <a:latin typeface="Cambria Math" charset="0"/>
+                        </a:rPr>
+                        <m:t>=1 </m:t>
+                      </m:r>
+                      <m:r>
+                        <a:rPr lang="en-US" sz="2000" b="0" i="1" smtClean="0">
+                          <a:latin typeface="Cambria Math" charset="0"/>
+                        </a:rPr>
+                        <m:t>𝑙𝑖𝑛𝑒</m:t>
+                      </m:r>
+                      <m:r>
+                        <a:rPr lang="en-US" sz="2000" b="0" i="1" smtClean="0">
+                          <a:latin typeface="Cambria Math" charset="0"/>
+                        </a:rPr>
+                        <m:t>, </m:t>
+                      </m:r>
+                      <m:r>
+                        <a:rPr lang="en-US" sz="2000" b="0" i="1" smtClean="0">
+                          <a:latin typeface="Cambria Math" charset="0"/>
+                        </a:rPr>
+                        <m:t>𝑜𝑟</m:t>
+                      </m:r>
+                      <m:r>
+                        <a:rPr lang="en-US" sz="2000" b="0" i="1" smtClean="0">
+                          <a:latin typeface="Cambria Math" charset="0"/>
+                        </a:rPr>
+                        <m:t> </m:t>
+                      </m:r>
+                      <m:r>
+                        <a:rPr lang="en-US" sz="2000" b="0" i="1" smtClean="0">
+                          <a:latin typeface="Cambria Math" charset="0"/>
+                        </a:rPr>
+                        <m:t>𝑐𝑢𝑟𝑣𝑒</m:t>
+                      </m:r>
+                    </m:oMath>
+                  </m:oMathPara>
+                </a14:m>
+                <a:endParaRPr lang="en-US" sz="2000" dirty="0"/>
+              </a:p>
+            </p:txBody>
+          </p:sp>
+        </mc:Choice>
+        <mc:Fallback xmlns="">
+          <p:sp>
+            <p:nvSpPr>
+              <p:cNvPr id="9" name="TextBox 8"/>
+              <p:cNvSpPr txBox="1">
+                <a:spLocks noRot="1" noChangeAspect="1" noMove="1" noResize="1" noEditPoints="1" noAdjustHandles="1" noChangeArrowheads="1" noChangeShapeType="1" noTextEdit="1"/>
+              </p:cNvSpPr>
+              <p:nvPr/>
+            </p:nvSpPr>
+            <p:spPr>
+              <a:xfrm>
+                <a:off x="1827212" y="4485105"/>
+                <a:ext cx="2441694" cy="299184"/>
+              </a:xfrm>
+              <a:prstGeom prst="rect">
+                <a:avLst/>
+              </a:prstGeom>
+              <a:blipFill rotWithShape="0">
+                <a:blip r:embed="rId5"/>
+                <a:stretch>
+                  <a:fillRect l="-1000" t="-155102" b="-179592"/>
+                </a:stretch>
+              </a:blipFill>
+            </p:spPr>
+            <p:txBody>
+              <a:bodyPr/>
+              <a:lstStyle/>
+              <a:p>
+                <a:r>
+                  <a:rPr lang="en-US">
+                    <a:noFill/>
+                  </a:rPr>
+                  <a:t> </a:t>
+                </a:r>
+              </a:p>
+            </p:txBody>
+          </p:sp>
+        </mc:Fallback>
+      </mc:AlternateContent>
+      <mc:AlternateContent xmlns:mc="http://schemas.openxmlformats.org/markup-compatibility/2006" xmlns:a14="http://schemas.microsoft.com/office/drawing/2010/main">
+        <mc:Choice Requires="a14">
+          <p:sp>
+            <p:nvSpPr>
+              <p:cNvPr id="10" name="TextBox 9"/>
+              <p:cNvSpPr txBox="1"/>
+              <p:nvPr/>
+            </p:nvSpPr>
+            <p:spPr>
+              <a:xfrm>
+                <a:off x="2015133" y="5146178"/>
+                <a:ext cx="2052998" cy="299184"/>
+              </a:xfrm>
+              <a:prstGeom prst="rect">
+                <a:avLst/>
+              </a:prstGeom>
+              <a:noFill/>
+            </p:spPr>
+            <p:txBody>
+              <a:bodyPr wrap="none" lIns="0" tIns="0" rIns="0" bIns="0" rtlCol="0">
+                <a:spAutoFit/>
+              </a:bodyPr>
+              <a:lstStyle/>
+              <a:p>
+                <a:pPr>
+                  <a:lnSpc>
+                    <a:spcPct val="90000"/>
+                  </a:lnSpc>
+                </a:pPr>
+                <a14:m>
+                  <m:oMathPara xmlns:m="http://schemas.openxmlformats.org/officeDocument/2006/math">
+                    <m:oMathParaPr>
+                      <m:jc m:val="centerGroup"/>
+                    </m:oMathParaPr>
+                    <m:oMath xmlns:m="http://schemas.openxmlformats.org/officeDocument/2006/math">
+                      <m:sSub>
+                        <m:sSubPr>
+                          <m:ctrlPr>
+                            <a:rPr lang="en-US" sz="2000" b="0" i="1" smtClean="0">
+                              <a:latin typeface="Cambria Math" panose="02040503050406030204" pitchFamily="18" charset="0"/>
+                            </a:rPr>
+                          </m:ctrlPr>
+                        </m:sSubPr>
+                        <m:e>
+                          <m:r>
+                            <a:rPr lang="en-US" sz="2000" b="0" i="1" smtClean="0">
+                              <a:latin typeface="Cambria Math" charset="0"/>
+                            </a:rPr>
+                            <m:t>𝑑</m:t>
+                          </m:r>
+                        </m:e>
+                        <m:sub>
+                          <m:r>
+                            <a:rPr lang="en-US" sz="2000" b="0" i="1" smtClean="0">
+                              <a:latin typeface="Cambria Math" charset="0"/>
+                            </a:rPr>
+                            <m:t>𝑓</m:t>
+                          </m:r>
+                        </m:sub>
+                      </m:sSub>
+                      <m:r>
+                        <a:rPr lang="en-US" sz="2000" b="0" i="1" smtClean="0">
+                          <a:latin typeface="Cambria Math" charset="0"/>
+                        </a:rPr>
+                        <m:t>=2 </m:t>
+                      </m:r>
+                      <m:r>
+                        <a:rPr lang="en-US" sz="2000" b="0" i="1" smtClean="0">
+                          <a:latin typeface="Cambria Math" charset="0"/>
+                        </a:rPr>
+                        <m:t>𝑠𝑜𝑙𝑖𝑑</m:t>
+                      </m:r>
+                      <m:r>
+                        <a:rPr lang="en-US" sz="2000" b="0" i="1" smtClean="0">
+                          <a:latin typeface="Cambria Math" charset="0"/>
+                        </a:rPr>
+                        <m:t> </m:t>
+                      </m:r>
+                      <m:r>
+                        <a:rPr lang="en-US" sz="2000" b="0" i="1" smtClean="0">
+                          <a:latin typeface="Cambria Math" charset="0"/>
+                        </a:rPr>
+                        <m:t>𝑑𝑖𝑠𝑘</m:t>
+                      </m:r>
+                    </m:oMath>
+                  </m:oMathPara>
+                </a14:m>
+                <a:endParaRPr lang="en-US" sz="2000" dirty="0"/>
+              </a:p>
+            </p:txBody>
+          </p:sp>
+        </mc:Choice>
+        <mc:Fallback xmlns="">
+          <p:sp>
+            <p:nvSpPr>
+              <p:cNvPr id="10" name="TextBox 9"/>
+              <p:cNvSpPr txBox="1">
+                <a:spLocks noRot="1" noChangeAspect="1" noMove="1" noResize="1" noEditPoints="1" noAdjustHandles="1" noChangeArrowheads="1" noChangeShapeType="1" noTextEdit="1"/>
+              </p:cNvSpPr>
+              <p:nvPr/>
+            </p:nvSpPr>
+            <p:spPr>
+              <a:xfrm>
+                <a:off x="2015133" y="5146178"/>
+                <a:ext cx="2052998" cy="299184"/>
+              </a:xfrm>
+              <a:prstGeom prst="rect">
+                <a:avLst/>
+              </a:prstGeom>
+              <a:blipFill rotWithShape="0">
+                <a:blip r:embed="rId6"/>
+                <a:stretch>
+                  <a:fillRect l="-1190" t="-155102" r="-595" b="-179592"/>
+                </a:stretch>
+              </a:blipFill>
+            </p:spPr>
+            <p:txBody>
+              <a:bodyPr/>
+              <a:lstStyle/>
+              <a:p>
+                <a:r>
+                  <a:rPr lang="en-US">
+                    <a:noFill/>
+                  </a:rPr>
+                  <a:t> </a:t>
+                </a:r>
+              </a:p>
+            </p:txBody>
+          </p:sp>
+        </mc:Fallback>
+      </mc:AlternateContent>
     </p:spTree>
     <p:extLst>
       <p:ext uri="{BB962C8B-B14F-4D97-AF65-F5344CB8AC3E}">
@@ -5511,72 +6144,99 @@
           <a:chExt cx="0" cy="0"/>
         </a:xfrm>
       </p:grpSpPr>
-      <p:sp>
-        <p:nvSpPr>
-          <p:cNvPr id="2" name="Title 1"/>
-          <p:cNvSpPr>
-            <a:spLocks noGrp="1"/>
-          </p:cNvSpPr>
-          <p:nvPr>
-            <p:ph type="title"/>
-          </p:nvPr>
-        </p:nvSpPr>
-        <p:spPr/>
-        <p:txBody>
-          <a:bodyPr/>
-          <a:lstStyle/>
-          <a:p>
-            <a:r>
-              <a:rPr lang="en-US" dirty="0"/>
-              <a:t>Add PLOTS</a:t>
-            </a:r>
-          </a:p>
-        </p:txBody>
-      </p:sp>
-      <p:sp>
-        <p:nvSpPr>
-          <p:cNvPr id="7" name="Content Placeholder 6"/>
-          <p:cNvSpPr>
-            <a:spLocks noGrp="1"/>
-          </p:cNvSpPr>
+      <p:pic>
+        <p:nvPicPr>
+          <p:cNvPr id="7" name="Picture 6"/>
+          <p:cNvPicPr>
+            <a:picLocks noChangeAspect="1"/>
+          </p:cNvPicPr>
+          <p:nvPr/>
+        </p:nvPicPr>
+        <p:blipFill>
+          <a:blip r:embed="rId2">
+            <a:extLst>
+              <a:ext uri="{28A0092B-C50C-407E-A947-70E740481C1C}">
+                <a14:useLocalDpi xmlns:a14="http://schemas.microsoft.com/office/drawing/2010/main" val="0"/>
+              </a:ext>
+            </a:extLst>
+          </a:blip>
+          <a:stretch>
+            <a:fillRect/>
+          </a:stretch>
+        </p:blipFill>
+        <p:spPr>
+          <a:xfrm>
+            <a:off x="7770812" y="1295400"/>
+            <a:ext cx="4267200" cy="4267200"/>
+          </a:xfrm>
+          <a:prstGeom prst="rect">
+            <a:avLst/>
+          </a:prstGeom>
+        </p:spPr>
+      </p:pic>
+      <p:pic>
+        <p:nvPicPr>
+          <p:cNvPr id="5" name="Picture 4"/>
+          <p:cNvPicPr>
+            <a:picLocks noChangeAspect="1"/>
+          </p:cNvPicPr>
+          <p:nvPr/>
+        </p:nvPicPr>
+        <p:blipFill>
+          <a:blip r:embed="rId3">
+            <a:extLst>
+              <a:ext uri="{28A0092B-C50C-407E-A947-70E740481C1C}">
+                <a14:useLocalDpi xmlns:a14="http://schemas.microsoft.com/office/drawing/2010/main" val="0"/>
+              </a:ext>
+            </a:extLst>
+          </a:blip>
+          <a:stretch>
+            <a:fillRect/>
+          </a:stretch>
+        </p:blipFill>
+        <p:spPr>
+          <a:xfrm>
+            <a:off x="3884612" y="1295400"/>
+            <a:ext cx="4267200" cy="4267200"/>
+          </a:xfrm>
+          <a:prstGeom prst="rect">
+            <a:avLst/>
+          </a:prstGeom>
+        </p:spPr>
+      </p:pic>
+      <p:pic>
+        <p:nvPicPr>
+          <p:cNvPr id="4" name="Content Placeholder 3"/>
+          <p:cNvPicPr>
+            <a:picLocks noGrp="1" noChangeAspect="1"/>
+          </p:cNvPicPr>
           <p:nvPr>
             <p:ph idx="1"/>
           </p:nvPr>
-        </p:nvSpPr>
-        <p:spPr/>
-        <p:txBody>
-          <a:bodyPr>
-            <a:normAutofit/>
-          </a:bodyPr>
-          <a:lstStyle/>
-          <a:p>
-            <a:endParaRPr lang="en-US" dirty="0"/>
-          </a:p>
-        </p:txBody>
-      </p:sp>
-      <p:sp>
-        <p:nvSpPr>
-          <p:cNvPr id="4" name="Text Placeholder 3"/>
-          <p:cNvSpPr>
-            <a:spLocks noGrp="1"/>
-          </p:cNvSpPr>
-          <p:nvPr>
-            <p:ph type="body" sz="half" idx="2"/>
-          </p:nvPr>
-        </p:nvSpPr>
-        <p:spPr/>
-        <p:txBody>
-          <a:bodyPr/>
-          <a:lstStyle/>
-          <a:p>
-            <a:endParaRPr lang="en-US" dirty="0"/>
-          </a:p>
-        </p:txBody>
-      </p:sp>
+        </p:nvPicPr>
+        <p:blipFill>
+          <a:blip r:embed="rId4">
+            <a:extLst>
+              <a:ext uri="{28A0092B-C50C-407E-A947-70E740481C1C}">
+                <a14:useLocalDpi xmlns:a14="http://schemas.microsoft.com/office/drawing/2010/main" val="0"/>
+              </a:ext>
+            </a:extLst>
+          </a:blip>
+          <a:stretch>
+            <a:fillRect/>
+          </a:stretch>
+        </p:blipFill>
+        <p:spPr>
+          <a:xfrm>
+            <a:off x="150812" y="1295400"/>
+            <a:ext cx="4274400" cy="4274400"/>
+          </a:xfrm>
+        </p:spPr>
+      </p:pic>
     </p:spTree>
     <p:extLst>
       <p:ext uri="{BB962C8B-B14F-4D97-AF65-F5344CB8AC3E}">
-        <p14:creationId xmlns:p14="http://schemas.microsoft.com/office/powerpoint/2010/main" val="1748889842"/>
+        <p14:creationId xmlns:p14="http://schemas.microsoft.com/office/powerpoint/2010/main" val="1548506332"/>
       </p:ext>
     </p:extLst>
   </p:cSld>
@@ -5617,14 +6277,358 @@
       </p:grpSpPr>
       <p:sp>
         <p:nvSpPr>
-          <p:cNvPr id="2" name="TextBox 1"/>
+          <p:cNvPr id="2" name="Title 1"/>
+          <p:cNvSpPr>
+            <a:spLocks noGrp="1"/>
+          </p:cNvSpPr>
+          <p:nvPr>
+            <p:ph type="title"/>
+          </p:nvPr>
+        </p:nvSpPr>
+        <p:spPr>
+          <a:xfrm>
+            <a:off x="6892332" y="101600"/>
+            <a:ext cx="4953002" cy="1066800"/>
+          </a:xfrm>
+        </p:spPr>
+        <p:txBody>
+          <a:bodyPr/>
+          <a:lstStyle/>
+          <a:p>
+            <a:r>
+              <a:rPr lang="en-US"/>
+              <a:t>Fractal dimensionality</a:t>
+            </a:r>
+          </a:p>
+        </p:txBody>
+      </p:sp>
+      <p:pic>
+        <p:nvPicPr>
+          <p:cNvPr id="4" name="Content Placeholder 3"/>
+          <p:cNvPicPr>
+            <a:picLocks noGrp="1" noChangeAspect="1"/>
+          </p:cNvPicPr>
+          <p:nvPr>
+            <p:ph idx="1"/>
+          </p:nvPr>
+        </p:nvPicPr>
+        <p:blipFill>
+          <a:blip r:embed="rId2">
+            <a:extLst>
+              <a:ext uri="{28A0092B-C50C-407E-A947-70E740481C1C}">
+                <a14:useLocalDpi xmlns:a14="http://schemas.microsoft.com/office/drawing/2010/main" val="0"/>
+              </a:ext>
+            </a:extLst>
+          </a:blip>
+          <a:stretch>
+            <a:fillRect/>
+          </a:stretch>
+        </p:blipFill>
+        <p:spPr>
+          <a:xfrm>
+            <a:off x="531812" y="635000"/>
+            <a:ext cx="5410200" cy="5410200"/>
+          </a:xfrm>
+        </p:spPr>
+      </p:pic>
+      <mc:AlternateContent xmlns:mc="http://schemas.openxmlformats.org/markup-compatibility/2006" xmlns:a14="http://schemas.microsoft.com/office/drawing/2010/main">
+        <mc:Choice Requires="a14">
+          <p:sp>
+            <p:nvSpPr>
+              <p:cNvPr id="5" name="TextBox 4"/>
+              <p:cNvSpPr txBox="1"/>
+              <p:nvPr/>
+            </p:nvSpPr>
+            <p:spPr>
+              <a:xfrm>
+                <a:off x="7694612" y="1580043"/>
+                <a:ext cx="3043643" cy="478721"/>
+              </a:xfrm>
+              <a:prstGeom prst="rect">
+                <a:avLst/>
+              </a:prstGeom>
+              <a:noFill/>
+            </p:spPr>
+            <p:txBody>
+              <a:bodyPr wrap="square" lIns="0" tIns="0" rIns="0" bIns="0" rtlCol="0">
+                <a:spAutoFit/>
+              </a:bodyPr>
+              <a:lstStyle/>
+              <a:p>
+                <a:pPr>
+                  <a:lnSpc>
+                    <a:spcPct val="90000"/>
+                  </a:lnSpc>
+                </a:pPr>
+                <a14:m>
+                  <m:oMathPara xmlns:m="http://schemas.openxmlformats.org/officeDocument/2006/math">
+                    <m:oMathParaPr>
+                      <m:jc m:val="centerGroup"/>
+                    </m:oMathParaPr>
+                    <m:oMath xmlns:m="http://schemas.openxmlformats.org/officeDocument/2006/math">
+                      <m:func>
+                        <m:funcPr>
+                          <m:ctrlPr>
+                            <a:rPr lang="en-US" sz="3200" b="0" i="1" smtClean="0">
+                              <a:latin typeface="Cambria Math" panose="02040503050406030204" pitchFamily="18" charset="0"/>
+                            </a:rPr>
+                          </m:ctrlPr>
+                        </m:funcPr>
+                        <m:fName>
+                          <m:r>
+                            <m:rPr>
+                              <m:sty m:val="p"/>
+                            </m:rPr>
+                            <a:rPr lang="en-US" sz="3200" b="0" i="0" smtClean="0">
+                              <a:latin typeface="Cambria Math" charset="0"/>
+                            </a:rPr>
+                            <m:t>log</m:t>
+                          </m:r>
+                        </m:fName>
+                        <m:e>
+                          <m:r>
+                            <a:rPr lang="en-US" sz="3200" b="0" i="1" smtClean="0">
+                              <a:latin typeface="Cambria Math" charset="0"/>
+                            </a:rPr>
+                            <m:t>𝑚</m:t>
+                          </m:r>
+                          <m:r>
+                            <a:rPr lang="en-US" sz="3200" b="0" i="1" smtClean="0">
+                              <a:latin typeface="Cambria Math" charset="0"/>
+                            </a:rPr>
+                            <m:t>=</m:t>
+                          </m:r>
+                          <m:sSub>
+                            <m:sSubPr>
+                              <m:ctrlPr>
+                                <a:rPr lang="en-US" sz="3200" b="0" i="1" smtClean="0">
+                                  <a:latin typeface="Cambria Math" panose="02040503050406030204" pitchFamily="18" charset="0"/>
+                                </a:rPr>
+                              </m:ctrlPr>
+                            </m:sSubPr>
+                            <m:e>
+                              <m:r>
+                                <a:rPr lang="en-US" sz="3200" b="0" i="1" smtClean="0">
+                                  <a:latin typeface="Cambria Math" charset="0"/>
+                                </a:rPr>
+                                <m:t>𝑑</m:t>
+                              </m:r>
+                            </m:e>
+                            <m:sub>
+                              <m:r>
+                                <a:rPr lang="en-US" sz="3200" b="0" i="1" smtClean="0">
+                                  <a:latin typeface="Cambria Math" charset="0"/>
+                                </a:rPr>
+                                <m:t>𝑓</m:t>
+                              </m:r>
+                            </m:sub>
+                          </m:sSub>
+                          <m:r>
+                            <m:rPr>
+                              <m:sty m:val="p"/>
+                            </m:rPr>
+                            <a:rPr lang="en-US" sz="3200" b="0" i="0" smtClean="0">
+                              <a:latin typeface="Cambria Math" charset="0"/>
+                            </a:rPr>
+                            <m:t>log</m:t>
+                          </m:r>
+                          <m:r>
+                            <a:rPr lang="en-US" sz="3200" b="0" i="1" smtClean="0">
+                              <a:latin typeface="Cambria Math" charset="0"/>
+                            </a:rPr>
+                            <m:t>⁡(</m:t>
+                          </m:r>
+                          <m:r>
+                            <a:rPr lang="en-US" sz="3200" b="0" i="1" smtClean="0">
+                              <a:latin typeface="Cambria Math" charset="0"/>
+                            </a:rPr>
+                            <m:t>𝑟</m:t>
+                          </m:r>
+                          <m:r>
+                            <a:rPr lang="en-US" sz="3200" b="0" i="1" smtClean="0">
+                              <a:latin typeface="Cambria Math" charset="0"/>
+                            </a:rPr>
+                            <m:t>)</m:t>
+                          </m:r>
+                        </m:e>
+                      </m:func>
+                    </m:oMath>
+                  </m:oMathPara>
+                </a14:m>
+                <a:endParaRPr lang="en-US" sz="3200" dirty="0"/>
+              </a:p>
+            </p:txBody>
+          </p:sp>
+        </mc:Choice>
+        <mc:Fallback xmlns="">
+          <p:sp>
+            <p:nvSpPr>
+              <p:cNvPr id="5" name="TextBox 4"/>
+              <p:cNvSpPr txBox="1">
+                <a:spLocks noRot="1" noChangeAspect="1" noMove="1" noResize="1" noEditPoints="1" noAdjustHandles="1" noChangeArrowheads="1" noChangeShapeType="1" noTextEdit="1"/>
+              </p:cNvSpPr>
+              <p:nvPr/>
+            </p:nvSpPr>
+            <p:spPr>
+              <a:xfrm>
+                <a:off x="7694612" y="1580043"/>
+                <a:ext cx="3043643" cy="478721"/>
+              </a:xfrm>
+              <a:prstGeom prst="rect">
+                <a:avLst/>
+              </a:prstGeom>
+              <a:blipFill rotWithShape="0">
+                <a:blip r:embed="rId3"/>
+                <a:stretch>
+                  <a:fillRect b="-3797"/>
+                </a:stretch>
+              </a:blipFill>
+            </p:spPr>
+            <p:txBody>
+              <a:bodyPr/>
+              <a:lstStyle/>
+              <a:p>
+                <a:r>
+                  <a:rPr lang="en-US">
+                    <a:noFill/>
+                  </a:rPr>
+                  <a:t> </a:t>
+                </a:r>
+              </a:p>
+            </p:txBody>
+          </p:sp>
+        </mc:Fallback>
+      </mc:AlternateContent>
+      <mc:AlternateContent xmlns:mc="http://schemas.openxmlformats.org/markup-compatibility/2006" xmlns:a14="http://schemas.microsoft.com/office/drawing/2010/main">
+        <mc:Choice Requires="a14">
+          <p:sp>
+            <p:nvSpPr>
+              <p:cNvPr id="7" name="TextBox 6"/>
+              <p:cNvSpPr txBox="1"/>
+              <p:nvPr/>
+            </p:nvSpPr>
+            <p:spPr>
+              <a:xfrm>
+                <a:off x="3579812" y="4191000"/>
+                <a:ext cx="1373709" cy="299184"/>
+              </a:xfrm>
+              <a:prstGeom prst="rect">
+                <a:avLst/>
+              </a:prstGeom>
+              <a:noFill/>
+            </p:spPr>
+            <p:txBody>
+              <a:bodyPr wrap="none" lIns="0" tIns="0" rIns="0" bIns="0" rtlCol="0">
+                <a:spAutoFit/>
+              </a:bodyPr>
+              <a:lstStyle/>
+              <a:p>
+                <a:pPr>
+                  <a:lnSpc>
+                    <a:spcPct val="90000"/>
+                  </a:lnSpc>
+                </a:pPr>
+                <a14:m>
+                  <m:oMathPara xmlns:m="http://schemas.openxmlformats.org/officeDocument/2006/math">
+                    <m:oMathParaPr>
+                      <m:jc m:val="centerGroup"/>
+                    </m:oMathParaPr>
+                    <m:oMath xmlns:m="http://schemas.openxmlformats.org/officeDocument/2006/math">
+                      <m:sSub>
+                        <m:sSubPr>
+                          <m:ctrlPr>
+                            <a:rPr lang="en-US" sz="2000" b="0" i="1" smtClean="0">
+                              <a:latin typeface="Cambria Math" panose="02040503050406030204" pitchFamily="18" charset="0"/>
+                            </a:rPr>
+                          </m:ctrlPr>
+                        </m:sSubPr>
+                        <m:e>
+                          <m:r>
+                            <a:rPr lang="en-US" sz="2000" b="0" i="1" smtClean="0">
+                              <a:latin typeface="Cambria Math" charset="0"/>
+                            </a:rPr>
+                            <m:t>𝑑</m:t>
+                          </m:r>
+                        </m:e>
+                        <m:sub>
+                          <m:r>
+                            <a:rPr lang="en-US" sz="2000" b="0" i="1" smtClean="0">
+                              <a:latin typeface="Cambria Math" charset="0"/>
+                            </a:rPr>
+                            <m:t>𝑓</m:t>
+                          </m:r>
+                        </m:sub>
+                      </m:sSub>
+                      <m:r>
+                        <a:rPr lang="en-US" sz="2000" b="0" i="1" smtClean="0">
+                          <a:latin typeface="Cambria Math" charset="0"/>
+                        </a:rPr>
+                        <m:t>=</m:t>
+                      </m:r>
+                      <m:r>
+                        <m:rPr>
+                          <m:nor/>
+                        </m:rPr>
+                        <a:rPr lang="en-US" sz="2000"/>
+                        <m:t>1.712</m:t>
+                      </m:r>
+                    </m:oMath>
+                  </m:oMathPara>
+                </a14:m>
+                <a:endParaRPr lang="en-US" sz="2400" dirty="0"/>
+              </a:p>
+            </p:txBody>
+          </p:sp>
+        </mc:Choice>
+        <mc:Fallback xmlns="">
+          <p:sp>
+            <p:nvSpPr>
+              <p:cNvPr id="7" name="TextBox 6"/>
+              <p:cNvSpPr txBox="1">
+                <a:spLocks noRot="1" noChangeAspect="1" noMove="1" noResize="1" noEditPoints="1" noAdjustHandles="1" noChangeArrowheads="1" noChangeShapeType="1" noTextEdit="1"/>
+              </p:cNvSpPr>
+              <p:nvPr/>
+            </p:nvSpPr>
+            <p:spPr>
+              <a:xfrm>
+                <a:off x="3579812" y="4191000"/>
+                <a:ext cx="1373709" cy="299184"/>
+              </a:xfrm>
+              <a:prstGeom prst="rect">
+                <a:avLst/>
+              </a:prstGeom>
+              <a:blipFill rotWithShape="0">
+                <a:blip r:embed="rId4"/>
+                <a:stretch>
+                  <a:fillRect l="-1770" t="-12245" r="-2212" b="-30612"/>
+                </a:stretch>
+              </a:blipFill>
+            </p:spPr>
+            <p:txBody>
+              <a:bodyPr/>
+              <a:lstStyle/>
+              <a:p>
+                <a:r>
+                  <a:rPr lang="en-US">
+                    <a:noFill/>
+                  </a:rPr>
+                  <a:t> </a:t>
+                </a:r>
+              </a:p>
+            </p:txBody>
+          </p:sp>
+        </mc:Fallback>
+      </mc:AlternateContent>
+      <p:sp>
+        <p:nvSpPr>
+          <p:cNvPr id="8" name="TextBox 7"/>
           <p:cNvSpPr txBox="1"/>
           <p:nvPr/>
         </p:nvSpPr>
         <p:spPr>
           <a:xfrm>
-            <a:off x="2817812" y="2819400"/>
-            <a:ext cx="5562600" cy="757130"/>
+            <a:off x="7044733" y="2496878"/>
+            <a:ext cx="4343400" cy="757130"/>
           </a:xfrm>
           <a:prstGeom prst="rect">
             <a:avLst/>
@@ -5643,8 +6647,161 @@
               </a:lnSpc>
             </a:pPr>
             <a:r>
+              <a:rPr lang="en-US" sz="2400" dirty="0"/>
+              <a:t>In 10 runs </a:t>
+            </a:r>
+            <a:r>
+              <a:rPr lang="en-US" sz="2400"/>
+              <a:t>fractal dimensionality:</a:t>
+            </a:r>
+          </a:p>
+        </p:txBody>
+      </p:sp>
+      <p:sp>
+        <p:nvSpPr>
+          <p:cNvPr id="9" name="TextBox 8"/>
+          <p:cNvSpPr txBox="1"/>
+          <p:nvPr/>
+        </p:nvSpPr>
+        <p:spPr>
+          <a:xfrm>
+            <a:off x="6683872" y="3583462"/>
+            <a:ext cx="5369921" cy="757130"/>
+          </a:xfrm>
+          <a:prstGeom prst="rect">
+            <a:avLst/>
+          </a:prstGeom>
+          <a:noFill/>
+        </p:spPr>
+        <p:txBody>
+          <a:bodyPr wrap="square" rtlCol="0">
+            <a:spAutoFit/>
+          </a:bodyPr>
+          <a:lstStyle/>
+          <a:p>
+            <a:pPr>
+              <a:lnSpc>
+                <a:spcPct val="90000"/>
+              </a:lnSpc>
+            </a:pPr>
+            <a:r>
+              <a:rPr lang="en-US" sz="2400" b="1"/>
+              <a:t>2.067, 1.653, 1.877, 1.833, 1.607, 1.832,1.782, 1.712, 1.843, 1.862</a:t>
+            </a:r>
+            <a:endParaRPr lang="en-US" sz="2400" b="1" dirty="0"/>
+          </a:p>
+        </p:txBody>
+      </p:sp>
+      <p:sp>
+        <p:nvSpPr>
+          <p:cNvPr id="10" name="TextBox 9"/>
+          <p:cNvSpPr txBox="1"/>
+          <p:nvPr/>
+        </p:nvSpPr>
+        <p:spPr>
+          <a:xfrm>
+            <a:off x="8054383" y="4876800"/>
+            <a:ext cx="2324099" cy="480131"/>
+          </a:xfrm>
+          <a:prstGeom prst="rect">
+            <a:avLst/>
+          </a:prstGeom>
+          <a:noFill/>
+        </p:spPr>
+        <p:txBody>
+          <a:bodyPr wrap="square" rtlCol="0">
+            <a:spAutoFit/>
+          </a:bodyPr>
+          <a:lstStyle/>
+          <a:p>
+            <a:pPr>
+              <a:lnSpc>
+                <a:spcPct val="90000"/>
+              </a:lnSpc>
+            </a:pPr>
+            <a:r>
+              <a:rPr lang="en-US" sz="2800" b="1" i="1" dirty="0">
+                <a:solidFill>
+                  <a:srgbClr val="FF0000"/>
+                </a:solidFill>
+              </a:rPr>
+              <a:t>mean=1.807</a:t>
+            </a:r>
+          </a:p>
+        </p:txBody>
+      </p:sp>
+    </p:spTree>
+    <p:extLst>
+      <p:ext uri="{BB962C8B-B14F-4D97-AF65-F5344CB8AC3E}">
+        <p14:creationId xmlns:p14="http://schemas.microsoft.com/office/powerpoint/2010/main" val="716936238"/>
+      </p:ext>
+    </p:extLst>
+  </p:cSld>
+  <p:clrMapOvr>
+    <a:masterClrMapping/>
+  </p:clrMapOvr>
+  <mc:AlternateContent xmlns:mc="http://schemas.openxmlformats.org/markup-compatibility/2006" xmlns:p14="http://schemas.microsoft.com/office/powerpoint/2010/main">
+    <mc:Choice Requires="p14">
+      <p:transition spd="med" p14:dur="700">
+        <p:fade/>
+      </p:transition>
+    </mc:Choice>
+    <mc:Fallback xmlns="">
+      <p:transition spd="med">
+        <p:fade/>
+      </p:transition>
+    </mc:Fallback>
+  </mc:AlternateContent>
+</p:sld>
+</file>
+
+<file path=ppt/slides/slide15.xml><?xml version="1.0" encoding="utf-8"?>
+<p:sld xmlns:a="http://schemas.openxmlformats.org/drawingml/2006/main" xmlns:r="http://schemas.openxmlformats.org/officeDocument/2006/relationships" xmlns:p="http://schemas.openxmlformats.org/presentationml/2006/main">
+  <p:cSld>
+    <p:spTree>
+      <p:nvGrpSpPr>
+        <p:cNvPr id="1" name=""/>
+        <p:cNvGrpSpPr/>
+        <p:nvPr/>
+      </p:nvGrpSpPr>
+      <p:grpSpPr>
+        <a:xfrm>
+          <a:off x="0" y="0"/>
+          <a:ext cx="0" cy="0"/>
+          <a:chOff x="0" y="0"/>
+          <a:chExt cx="0" cy="0"/>
+        </a:xfrm>
+      </p:grpSpPr>
+      <p:sp>
+        <p:nvSpPr>
+          <p:cNvPr id="2" name="TextBox 1"/>
+          <p:cNvSpPr txBox="1"/>
+          <p:nvPr/>
+        </p:nvSpPr>
+        <p:spPr>
+          <a:xfrm>
+            <a:off x="2817812" y="2819400"/>
+            <a:ext cx="5562600" cy="1421928"/>
+          </a:xfrm>
+          <a:prstGeom prst="rect">
+            <a:avLst/>
+          </a:prstGeom>
+          <a:noFill/>
+        </p:spPr>
+        <p:txBody>
+          <a:bodyPr wrap="square" rtlCol="0">
+            <a:spAutoFit/>
+          </a:bodyPr>
+          <a:lstStyle/>
+          <a:p>
+            <a:pPr>
+              <a:lnSpc>
+                <a:spcPct val="90000"/>
+              </a:lnSpc>
+            </a:pPr>
+            <a:r>
               <a:rPr lang="en-US" sz="4800" dirty="0"/>
-              <a:t>Thanks for your time!</a:t>
+              <a:t>Thank you for your time!</a:t>
             </a:r>
           </a:p>
         </p:txBody>

</xml_diff>